<commit_message>
Renamed activity to service function
</commit_message>
<xml_diff>
--- a/docs/diagrams.pptx
+++ b/docs/diagrams.pptx
@@ -193,7 +193,7 @@
           </a:lstStyle>
           <a:p>
             <a:fld id="{AB2E4302-E9AB-0549-A672-F7D42312B8D1}" type="datetimeFigureOut">
-              <a:t>28/11/17</a:t>
+              <a:t>29/11/17</a:t>
             </a:fld>
             <a:endParaRPr lang="en-US"/>
           </a:p>
@@ -1135,7 +1135,7 @@
           <a:lstStyle/>
           <a:p>
             <a:fld id="{E69A878D-89FF-BF47-B66F-1617CBC883C6}" type="datetimeFigureOut">
-              <a:t>28/11/17</a:t>
+              <a:t>29/11/17</a:t>
             </a:fld>
             <a:endParaRPr lang="en-US"/>
           </a:p>
@@ -1327,7 +1327,7 @@
           <a:lstStyle/>
           <a:p>
             <a:fld id="{E69A878D-89FF-BF47-B66F-1617CBC883C6}" type="datetimeFigureOut">
-              <a:t>28/11/17</a:t>
+              <a:t>29/11/17</a:t>
             </a:fld>
             <a:endParaRPr lang="en-US"/>
           </a:p>
@@ -1957,7 +1957,7 @@
           <a:lstStyle/>
           <a:p>
             <a:fld id="{E69A878D-89FF-BF47-B66F-1617CBC883C6}" type="datetimeFigureOut">
-              <a:t>28/11/17</a:t>
+              <a:t>29/11/17</a:t>
             </a:fld>
             <a:endParaRPr lang="en-US"/>
           </a:p>
@@ -2390,7 +2390,7 @@
           <a:lstStyle/>
           <a:p>
             <a:fld id="{E69A878D-89FF-BF47-B66F-1617CBC883C6}" type="datetimeFigureOut">
-              <a:t>28/11/17</a:t>
+              <a:t>29/11/17</a:t>
             </a:fld>
             <a:endParaRPr lang="en-US"/>
           </a:p>
@@ -2521,7 +2521,7 @@
           <a:lstStyle/>
           <a:p>
             <a:fld id="{E69A878D-89FF-BF47-B66F-1617CBC883C6}" type="datetimeFigureOut">
-              <a:t>28/11/17</a:t>
+              <a:t>29/11/17</a:t>
             </a:fld>
             <a:endParaRPr lang="en-US"/>
           </a:p>
@@ -2630,7 +2630,7 @@
           <a:lstStyle/>
           <a:p>
             <a:fld id="{E69A878D-89FF-BF47-B66F-1617CBC883C6}" type="datetimeFigureOut">
-              <a:t>28/11/17</a:t>
+              <a:t>29/11/17</a:t>
             </a:fld>
             <a:endParaRPr lang="en-US"/>
           </a:p>
@@ -2919,7 +2919,7 @@
           <a:lstStyle/>
           <a:p>
             <a:fld id="{E69A878D-89FF-BF47-B66F-1617CBC883C6}" type="datetimeFigureOut">
-              <a:t>28/11/17</a:t>
+              <a:t>29/11/17</a:t>
             </a:fld>
             <a:endParaRPr lang="en-US"/>
           </a:p>
@@ -3185,7 +3185,7 @@
           <a:lstStyle/>
           <a:p>
             <a:fld id="{E69A878D-89FF-BF47-B66F-1617CBC883C6}" type="datetimeFigureOut">
-              <a:t>28/11/17</a:t>
+              <a:t>29/11/17</a:t>
             </a:fld>
             <a:endParaRPr lang="en-US"/>
           </a:p>
@@ -5349,11 +5349,7 @@
           <a:p>
             <a:r>
               <a:rPr lang="en-US" sz="2000"/>
-              <a:t>HTTP </a:t>
-            </a:r>
-            <a:r>
-              <a:rPr lang="en-US" sz="2000"/>
-              <a:t>RockScript SPI protocol</a:t>
+              <a:t>HTTP RockScript SPI protocol</a:t>
             </a:r>
           </a:p>
         </p:txBody>
@@ -5684,8 +5680,8 @@
         </p:nvSpPr>
         <p:spPr>
           <a:xfrm>
-            <a:off x="416537" y="1590317"/>
-            <a:ext cx="1958915" cy="465925"/>
+            <a:off x="577404" y="2182814"/>
+            <a:ext cx="2498104" cy="1803669"/>
           </a:xfrm>
           <a:prstGeom prst="rect">
             <a:avLst/>
@@ -5715,550 +5711,58 @@
           </a:fontRef>
         </p:style>
         <p:txBody>
-          <a:bodyPr rtlCol="0" anchor="ctr"/>
-          <a:lstStyle/>
-          <a:p>
-            <a:pPr algn="ctr"/>
-            <a:endParaRPr lang="en-US">
-              <a:latin typeface="Open Sans"/>
-              <a:cs typeface="Open Sans"/>
+          <a:bodyPr rtlCol="0" anchor="t"/>
+          <a:lstStyle/>
+          <a:p>
+            <a:r>
+              <a:rPr lang="en-US" sz="1000">
+                <a:latin typeface="Courier New"/>
+                <a:cs typeface="Courier New"/>
+              </a:rPr>
+              <a:t>var mySvc = system</a:t>
+            </a:r>
+          </a:p>
+          <a:p>
+            <a:r>
+              <a:rPr lang="en-US" sz="1000">
+                <a:latin typeface="Courier New"/>
+                <a:cs typeface="Courier New"/>
+              </a:rPr>
+              <a:t>.import('host/mysvc');</a:t>
+            </a:r>
+          </a:p>
+          <a:p>
+            <a:endParaRPr lang="en-US" sz="1000">
+              <a:latin typeface="Courier New"/>
+              <a:cs typeface="Courier New"/>
             </a:endParaRPr>
           </a:p>
-        </p:txBody>
-      </p:sp>
-      <p:sp>
-        <p:nvSpPr>
-          <p:cNvPr id="13" name="Rectangle 12"/>
-          <p:cNvSpPr/>
-          <p:nvPr/>
-        </p:nvSpPr>
-        <p:spPr>
-          <a:xfrm>
-            <a:off x="568937" y="1742717"/>
-            <a:ext cx="1958915" cy="465925"/>
-          </a:xfrm>
-          <a:prstGeom prst="rect">
-            <a:avLst/>
-          </a:prstGeom>
-          <a:solidFill>
-            <a:srgbClr val="3F80CD"/>
-          </a:solidFill>
-          <a:ln w="28575" cmpd="sng">
-            <a:solidFill>
-              <a:schemeClr val="bg1"/>
-            </a:solidFill>
-          </a:ln>
-          <a:effectLst/>
-        </p:spPr>
-        <p:style>
-          <a:lnRef idx="1">
-            <a:schemeClr val="accent1"/>
-          </a:lnRef>
-          <a:fillRef idx="3">
-            <a:schemeClr val="accent1"/>
-          </a:fillRef>
-          <a:effectRef idx="2">
-            <a:schemeClr val="accent1"/>
-          </a:effectRef>
-          <a:fontRef idx="minor">
-            <a:schemeClr val="lt1"/>
-          </a:fontRef>
-        </p:style>
-        <p:txBody>
-          <a:bodyPr rtlCol="0" anchor="ctr"/>
-          <a:lstStyle/>
-          <a:p>
-            <a:pPr algn="ctr"/>
-            <a:endParaRPr lang="en-US">
-              <a:latin typeface="Open Sans"/>
-              <a:cs typeface="Open Sans"/>
+          <a:p>
+            <a:r>
+              <a:rPr lang="en-US" sz="1000">
+                <a:latin typeface="Courier New"/>
+                <a:cs typeface="Courier New"/>
+              </a:rPr>
+              <a:t>var http = system</a:t>
+            </a:r>
+          </a:p>
+          <a:p>
+            <a:r>
+              <a:rPr lang="en-US" sz="1000">
+                <a:latin typeface="Courier New"/>
+                <a:cs typeface="Courier New"/>
+              </a:rPr>
+              <a:t>.import('rockscript.io/http');</a:t>
+            </a:r>
+          </a:p>
+          <a:p>
+            <a:endParaRPr lang="en-US" sz="1000">
+              <a:latin typeface="Courier New"/>
+              <a:cs typeface="Courier New"/>
             </a:endParaRPr>
           </a:p>
         </p:txBody>
       </p:sp>
-      <p:sp>
-        <p:nvSpPr>
-          <p:cNvPr id="17" name="Rectangle 16"/>
-          <p:cNvSpPr/>
-          <p:nvPr/>
-        </p:nvSpPr>
-        <p:spPr>
-          <a:xfrm>
-            <a:off x="721337" y="1895117"/>
-            <a:ext cx="1958915" cy="465925"/>
-          </a:xfrm>
-          <a:prstGeom prst="rect">
-            <a:avLst/>
-          </a:prstGeom>
-          <a:solidFill>
-            <a:srgbClr val="3F80CD"/>
-          </a:solidFill>
-          <a:ln w="28575" cmpd="sng">
-            <a:solidFill>
-              <a:schemeClr val="bg1"/>
-            </a:solidFill>
-          </a:ln>
-          <a:effectLst/>
-        </p:spPr>
-        <p:style>
-          <a:lnRef idx="1">
-            <a:schemeClr val="accent1"/>
-          </a:lnRef>
-          <a:fillRef idx="3">
-            <a:schemeClr val="accent1"/>
-          </a:fillRef>
-          <a:effectRef idx="2">
-            <a:schemeClr val="accent1"/>
-          </a:effectRef>
-          <a:fontRef idx="minor">
-            <a:schemeClr val="lt1"/>
-          </a:fontRef>
-        </p:style>
-        <p:txBody>
-          <a:bodyPr rtlCol="0" anchor="ctr"/>
-          <a:lstStyle/>
-          <a:p>
-            <a:pPr algn="ctr"/>
-            <a:r>
-              <a:rPr lang="en-US">
-                <a:latin typeface="Open Sans"/>
-                <a:cs typeface="Open Sans"/>
-              </a:rPr>
-              <a:t>Script</a:t>
-            </a:r>
-          </a:p>
-        </p:txBody>
-      </p:sp>
-      <p:sp>
-        <p:nvSpPr>
-          <p:cNvPr id="19" name="Rectangle 18"/>
-          <p:cNvSpPr/>
-          <p:nvPr/>
-        </p:nvSpPr>
-        <p:spPr>
-          <a:xfrm>
-            <a:off x="568937" y="2689270"/>
-            <a:ext cx="1958915" cy="465925"/>
-          </a:xfrm>
-          <a:prstGeom prst="rect">
-            <a:avLst/>
-          </a:prstGeom>
-          <a:solidFill>
-            <a:srgbClr val="3F80CD"/>
-          </a:solidFill>
-          <a:ln w="28575" cmpd="sng">
-            <a:solidFill>
-              <a:schemeClr val="bg1"/>
-            </a:solidFill>
-          </a:ln>
-          <a:effectLst/>
-        </p:spPr>
-        <p:style>
-          <a:lnRef idx="1">
-            <a:schemeClr val="accent1"/>
-          </a:lnRef>
-          <a:fillRef idx="3">
-            <a:schemeClr val="accent1"/>
-          </a:fillRef>
-          <a:effectRef idx="2">
-            <a:schemeClr val="accent1"/>
-          </a:effectRef>
-          <a:fontRef idx="minor">
-            <a:schemeClr val="lt1"/>
-          </a:fontRef>
-        </p:style>
-        <p:txBody>
-          <a:bodyPr rtlCol="0" anchor="ctr"/>
-          <a:lstStyle/>
-          <a:p>
-            <a:pPr algn="ctr"/>
-            <a:endParaRPr lang="en-US">
-              <a:latin typeface="Open Sans"/>
-              <a:cs typeface="Open Sans"/>
-            </a:endParaRPr>
-          </a:p>
-        </p:txBody>
-      </p:sp>
-      <p:sp>
-        <p:nvSpPr>
-          <p:cNvPr id="20" name="Rectangle 19"/>
-          <p:cNvSpPr/>
-          <p:nvPr/>
-        </p:nvSpPr>
-        <p:spPr>
-          <a:xfrm>
-            <a:off x="721337" y="2841670"/>
-            <a:ext cx="1958915" cy="465925"/>
-          </a:xfrm>
-          <a:prstGeom prst="rect">
-            <a:avLst/>
-          </a:prstGeom>
-          <a:solidFill>
-            <a:srgbClr val="3F80CD"/>
-          </a:solidFill>
-          <a:ln w="28575" cmpd="sng">
-            <a:solidFill>
-              <a:schemeClr val="bg1"/>
-            </a:solidFill>
-          </a:ln>
-          <a:effectLst/>
-        </p:spPr>
-        <p:style>
-          <a:lnRef idx="1">
-            <a:schemeClr val="accent1"/>
-          </a:lnRef>
-          <a:fillRef idx="3">
-            <a:schemeClr val="accent1"/>
-          </a:fillRef>
-          <a:effectRef idx="2">
-            <a:schemeClr val="accent1"/>
-          </a:effectRef>
-          <a:fontRef idx="minor">
-            <a:schemeClr val="lt1"/>
-          </a:fontRef>
-        </p:style>
-        <p:txBody>
-          <a:bodyPr rtlCol="0" anchor="ctr"/>
-          <a:lstStyle/>
-          <a:p>
-            <a:pPr algn="ctr"/>
-            <a:endParaRPr lang="en-US">
-              <a:latin typeface="Open Sans"/>
-              <a:cs typeface="Open Sans"/>
-            </a:endParaRPr>
-          </a:p>
-        </p:txBody>
-      </p:sp>
-      <p:sp>
-        <p:nvSpPr>
-          <p:cNvPr id="21" name="Rectangle 20"/>
-          <p:cNvSpPr/>
-          <p:nvPr/>
-        </p:nvSpPr>
-        <p:spPr>
-          <a:xfrm>
-            <a:off x="873737" y="2994070"/>
-            <a:ext cx="1958915" cy="465925"/>
-          </a:xfrm>
-          <a:prstGeom prst="rect">
-            <a:avLst/>
-          </a:prstGeom>
-          <a:solidFill>
-            <a:srgbClr val="3F80CD"/>
-          </a:solidFill>
-          <a:ln w="28575" cmpd="sng">
-            <a:solidFill>
-              <a:schemeClr val="bg1"/>
-            </a:solidFill>
-          </a:ln>
-          <a:effectLst/>
-        </p:spPr>
-        <p:style>
-          <a:lnRef idx="1">
-            <a:schemeClr val="accent1"/>
-          </a:lnRef>
-          <a:fillRef idx="3">
-            <a:schemeClr val="accent1"/>
-          </a:fillRef>
-          <a:effectRef idx="2">
-            <a:schemeClr val="accent1"/>
-          </a:effectRef>
-          <a:fontRef idx="minor">
-            <a:schemeClr val="lt1"/>
-          </a:fontRef>
-        </p:style>
-        <p:txBody>
-          <a:bodyPr rtlCol="0" anchor="ctr"/>
-          <a:lstStyle/>
-          <a:p>
-            <a:pPr algn="ctr"/>
-            <a:r>
-              <a:rPr lang="en-US">
-                <a:latin typeface="Open Sans"/>
-                <a:cs typeface="Open Sans"/>
-              </a:rPr>
-              <a:t>Script version</a:t>
-            </a:r>
-          </a:p>
-        </p:txBody>
-      </p:sp>
-      <p:sp>
-        <p:nvSpPr>
-          <p:cNvPr id="22" name="Rectangle 21"/>
-          <p:cNvSpPr/>
-          <p:nvPr/>
-        </p:nvSpPr>
-        <p:spPr>
-          <a:xfrm>
-            <a:off x="730695" y="3774387"/>
-            <a:ext cx="1958915" cy="465925"/>
-          </a:xfrm>
-          <a:prstGeom prst="rect">
-            <a:avLst/>
-          </a:prstGeom>
-          <a:solidFill>
-            <a:srgbClr val="3F80CD"/>
-          </a:solidFill>
-          <a:ln w="28575" cmpd="sng">
-            <a:solidFill>
-              <a:schemeClr val="bg1"/>
-            </a:solidFill>
-          </a:ln>
-          <a:effectLst/>
-        </p:spPr>
-        <p:style>
-          <a:lnRef idx="1">
-            <a:schemeClr val="accent1"/>
-          </a:lnRef>
-          <a:fillRef idx="3">
-            <a:schemeClr val="accent1"/>
-          </a:fillRef>
-          <a:effectRef idx="2">
-            <a:schemeClr val="accent1"/>
-          </a:effectRef>
-          <a:fontRef idx="minor">
-            <a:schemeClr val="lt1"/>
-          </a:fontRef>
-        </p:style>
-        <p:txBody>
-          <a:bodyPr rtlCol="0" anchor="ctr"/>
-          <a:lstStyle/>
-          <a:p>
-            <a:pPr algn="ctr"/>
-            <a:endParaRPr lang="en-US">
-              <a:latin typeface="Open Sans"/>
-              <a:cs typeface="Open Sans"/>
-            </a:endParaRPr>
-          </a:p>
-        </p:txBody>
-      </p:sp>
-      <p:sp>
-        <p:nvSpPr>
-          <p:cNvPr id="23" name="Rectangle 22"/>
-          <p:cNvSpPr/>
-          <p:nvPr/>
-        </p:nvSpPr>
-        <p:spPr>
-          <a:xfrm>
-            <a:off x="883095" y="3926787"/>
-            <a:ext cx="1958915" cy="465925"/>
-          </a:xfrm>
-          <a:prstGeom prst="rect">
-            <a:avLst/>
-          </a:prstGeom>
-          <a:solidFill>
-            <a:srgbClr val="3F80CD"/>
-          </a:solidFill>
-          <a:ln w="28575" cmpd="sng">
-            <a:solidFill>
-              <a:schemeClr val="bg1"/>
-            </a:solidFill>
-          </a:ln>
-          <a:effectLst/>
-        </p:spPr>
-        <p:style>
-          <a:lnRef idx="1">
-            <a:schemeClr val="accent1"/>
-          </a:lnRef>
-          <a:fillRef idx="3">
-            <a:schemeClr val="accent1"/>
-          </a:fillRef>
-          <a:effectRef idx="2">
-            <a:schemeClr val="accent1"/>
-          </a:effectRef>
-          <a:fontRef idx="minor">
-            <a:schemeClr val="lt1"/>
-          </a:fontRef>
-        </p:style>
-        <p:txBody>
-          <a:bodyPr rtlCol="0" anchor="ctr"/>
-          <a:lstStyle/>
-          <a:p>
-            <a:pPr algn="ctr"/>
-            <a:endParaRPr lang="en-US">
-              <a:latin typeface="Open Sans"/>
-              <a:cs typeface="Open Sans"/>
-            </a:endParaRPr>
-          </a:p>
-        </p:txBody>
-      </p:sp>
-      <p:sp>
-        <p:nvSpPr>
-          <p:cNvPr id="24" name="Rectangle 23"/>
-          <p:cNvSpPr/>
-          <p:nvPr/>
-        </p:nvSpPr>
-        <p:spPr>
-          <a:xfrm>
-            <a:off x="1035495" y="4079187"/>
-            <a:ext cx="1958915" cy="465925"/>
-          </a:xfrm>
-          <a:prstGeom prst="rect">
-            <a:avLst/>
-          </a:prstGeom>
-          <a:solidFill>
-            <a:srgbClr val="3F80CD"/>
-          </a:solidFill>
-          <a:ln w="28575" cmpd="sng">
-            <a:solidFill>
-              <a:schemeClr val="bg1"/>
-            </a:solidFill>
-          </a:ln>
-          <a:effectLst/>
-        </p:spPr>
-        <p:style>
-          <a:lnRef idx="1">
-            <a:schemeClr val="accent1"/>
-          </a:lnRef>
-          <a:fillRef idx="3">
-            <a:schemeClr val="accent1"/>
-          </a:fillRef>
-          <a:effectRef idx="2">
-            <a:schemeClr val="accent1"/>
-          </a:effectRef>
-          <a:fontRef idx="minor">
-            <a:schemeClr val="lt1"/>
-          </a:fontRef>
-        </p:style>
-        <p:txBody>
-          <a:bodyPr rtlCol="0" anchor="ctr"/>
-          <a:lstStyle/>
-          <a:p>
-            <a:pPr algn="ctr"/>
-            <a:r>
-              <a:rPr lang="en-US">
-                <a:latin typeface="Open Sans"/>
-                <a:cs typeface="Open Sans"/>
-              </a:rPr>
-              <a:t>Script execution</a:t>
-            </a:r>
-          </a:p>
-        </p:txBody>
-      </p:sp>
-      <p:cxnSp>
-        <p:nvCxnSpPr>
-          <p:cNvPr id="3" name="Straight Connector 2"/>
-          <p:cNvCxnSpPr>
-            <a:stCxn id="17" idx="2"/>
-            <a:endCxn id="20" idx="0"/>
-          </p:cNvCxnSpPr>
-          <p:nvPr/>
-        </p:nvCxnSpPr>
-        <p:spPr>
-          <a:xfrm>
-            <a:off x="1700795" y="2361042"/>
-            <a:ext cx="0" cy="480628"/>
-          </a:xfrm>
-          <a:prstGeom prst="line">
-            <a:avLst/>
-          </a:prstGeom>
-          <a:solidFill>
-            <a:srgbClr val="3F80CD"/>
-          </a:solidFill>
-          <a:ln w="28575" cmpd="sng">
-            <a:solidFill>
-              <a:schemeClr val="bg1"/>
-            </a:solidFill>
-          </a:ln>
-          <a:effectLst/>
-        </p:spPr>
-        <p:style>
-          <a:lnRef idx="1">
-            <a:schemeClr val="accent1"/>
-          </a:lnRef>
-          <a:fillRef idx="3">
-            <a:schemeClr val="accent1"/>
-          </a:fillRef>
-          <a:effectRef idx="2">
-            <a:schemeClr val="accent1"/>
-          </a:effectRef>
-          <a:fontRef idx="minor">
-            <a:schemeClr val="lt1"/>
-          </a:fontRef>
-        </p:style>
-      </p:cxnSp>
-      <p:cxnSp>
-        <p:nvCxnSpPr>
-          <p:cNvPr id="27" name="Straight Connector 26"/>
-          <p:cNvCxnSpPr>
-            <a:stCxn id="17" idx="2"/>
-            <a:endCxn id="19" idx="0"/>
-          </p:cNvCxnSpPr>
-          <p:nvPr/>
-        </p:nvCxnSpPr>
-        <p:spPr>
-          <a:xfrm flipH="1">
-            <a:off x="1555323" y="2361042"/>
-            <a:ext cx="138545" cy="328228"/>
-          </a:xfrm>
-          <a:prstGeom prst="line">
-            <a:avLst/>
-          </a:prstGeom>
-          <a:solidFill>
-            <a:srgbClr val="3F80CD"/>
-          </a:solidFill>
-          <a:ln w="28575" cmpd="sng">
-            <a:solidFill>
-              <a:schemeClr val="bg1"/>
-            </a:solidFill>
-          </a:ln>
-          <a:effectLst/>
-        </p:spPr>
-        <p:style>
-          <a:lnRef idx="1">
-            <a:schemeClr val="accent1"/>
-          </a:lnRef>
-          <a:fillRef idx="3">
-            <a:schemeClr val="accent1"/>
-          </a:fillRef>
-          <a:effectRef idx="2">
-            <a:schemeClr val="accent1"/>
-          </a:effectRef>
-          <a:fontRef idx="minor">
-            <a:schemeClr val="lt1"/>
-          </a:fontRef>
-        </p:style>
-      </p:cxnSp>
-      <p:cxnSp>
-        <p:nvCxnSpPr>
-          <p:cNvPr id="39" name="Straight Connector 38"/>
-          <p:cNvCxnSpPr/>
-          <p:nvPr/>
-        </p:nvCxnSpPr>
-        <p:spPr>
-          <a:xfrm>
-            <a:off x="1714020" y="2361042"/>
-            <a:ext cx="125950" cy="633028"/>
-          </a:xfrm>
-          <a:prstGeom prst="line">
-            <a:avLst/>
-          </a:prstGeom>
-          <a:solidFill>
-            <a:srgbClr val="3F80CD"/>
-          </a:solidFill>
-          <a:ln w="28575" cmpd="sng">
-            <a:solidFill>
-              <a:schemeClr val="bg1"/>
-            </a:solidFill>
-            <a:headEnd type="oval" w="med" len="med"/>
-          </a:ln>
-          <a:effectLst/>
-        </p:spPr>
-        <p:style>
-          <a:lnRef idx="1">
-            <a:schemeClr val="accent1"/>
-          </a:lnRef>
-          <a:fillRef idx="3">
-            <a:schemeClr val="accent1"/>
-          </a:fillRef>
-          <a:effectRef idx="2">
-            <a:schemeClr val="accent1"/>
-          </a:effectRef>
-          <a:fontRef idx="minor">
-            <a:schemeClr val="lt1"/>
-          </a:fontRef>
-        </p:style>
-      </p:cxnSp>
       <p:sp>
         <p:nvSpPr>
           <p:cNvPr id="52" name="Rectangle 51"/>
@@ -6326,13 +5830,14 @@
           <p:cNvPr id="59" name="Straight Connector 58"/>
           <p:cNvCxnSpPr>
             <a:stCxn id="86" idx="3"/>
+            <a:endCxn id="38" idx="1"/>
           </p:cNvCxnSpPr>
           <p:nvPr/>
         </p:nvCxnSpPr>
         <p:spPr>
           <a:xfrm>
-            <a:off x="4301295" y="3986483"/>
-            <a:ext cx="726385" cy="0"/>
+            <a:off x="4301295" y="3986128"/>
+            <a:ext cx="1334923" cy="355"/>
           </a:xfrm>
           <a:prstGeom prst="line">
             <a:avLst/>
@@ -6523,7 +6028,7 @@
         </p:nvSpPr>
         <p:spPr>
           <a:xfrm>
-            <a:off x="6499442" y="3573775"/>
+            <a:off x="7107980" y="3573775"/>
             <a:ext cx="1590514" cy="825415"/>
           </a:xfrm>
           <a:prstGeom prst="rect">
@@ -6585,8 +6090,8 @@
         </p:nvSpPr>
         <p:spPr>
           <a:xfrm rot="16200000">
-            <a:off x="6014855" y="2360655"/>
-            <a:ext cx="1583036" cy="400110"/>
+            <a:off x="6110866" y="2376044"/>
+            <a:ext cx="1391013" cy="369332"/>
           </a:xfrm>
           <a:prstGeom prst="rect">
             <a:avLst/>
@@ -6600,233 +6105,9 @@
           <a:lstStyle/>
           <a:p>
             <a:r>
-              <a:rPr lang="en-US" sz="2000"/>
+              <a:rPr lang="en-US"/>
               <a:t>Any protocol</a:t>
             </a:r>
-          </a:p>
-        </p:txBody>
-      </p:sp>
-      <p:cxnSp>
-        <p:nvCxnSpPr>
-          <p:cNvPr id="73" name="Straight Connector 72"/>
-          <p:cNvCxnSpPr/>
-          <p:nvPr/>
-        </p:nvCxnSpPr>
-        <p:spPr>
-          <a:xfrm>
-            <a:off x="1853195" y="3459995"/>
-            <a:ext cx="0" cy="480628"/>
-          </a:xfrm>
-          <a:prstGeom prst="line">
-            <a:avLst/>
-          </a:prstGeom>
-          <a:solidFill>
-            <a:srgbClr val="3F80CD"/>
-          </a:solidFill>
-          <a:ln w="28575" cmpd="sng">
-            <a:solidFill>
-              <a:schemeClr val="bg1"/>
-            </a:solidFill>
-          </a:ln>
-          <a:effectLst/>
-        </p:spPr>
-        <p:style>
-          <a:lnRef idx="1">
-            <a:schemeClr val="accent1"/>
-          </a:lnRef>
-          <a:fillRef idx="3">
-            <a:schemeClr val="accent1"/>
-          </a:fillRef>
-          <a:effectRef idx="2">
-            <a:schemeClr val="accent1"/>
-          </a:effectRef>
-          <a:fontRef idx="minor">
-            <a:schemeClr val="lt1"/>
-          </a:fontRef>
-        </p:style>
-      </p:cxnSp>
-      <p:cxnSp>
-        <p:nvCxnSpPr>
-          <p:cNvPr id="74" name="Straight Connector 73"/>
-          <p:cNvCxnSpPr/>
-          <p:nvPr/>
-        </p:nvCxnSpPr>
-        <p:spPr>
-          <a:xfrm flipH="1">
-            <a:off x="1714020" y="3459995"/>
-            <a:ext cx="125950" cy="328228"/>
-          </a:xfrm>
-          <a:prstGeom prst="line">
-            <a:avLst/>
-          </a:prstGeom>
-          <a:solidFill>
-            <a:srgbClr val="3F80CD"/>
-          </a:solidFill>
-          <a:ln w="28575" cmpd="sng">
-            <a:solidFill>
-              <a:schemeClr val="bg1"/>
-            </a:solidFill>
-          </a:ln>
-          <a:effectLst/>
-        </p:spPr>
-        <p:style>
-          <a:lnRef idx="1">
-            <a:schemeClr val="accent1"/>
-          </a:lnRef>
-          <a:fillRef idx="3">
-            <a:schemeClr val="accent1"/>
-          </a:fillRef>
-          <a:effectRef idx="2">
-            <a:schemeClr val="accent1"/>
-          </a:effectRef>
-          <a:fontRef idx="minor">
-            <a:schemeClr val="lt1"/>
-          </a:fontRef>
-        </p:style>
-      </p:cxnSp>
-      <p:cxnSp>
-        <p:nvCxnSpPr>
-          <p:cNvPr id="75" name="Straight Connector 74"/>
-          <p:cNvCxnSpPr/>
-          <p:nvPr/>
-        </p:nvCxnSpPr>
-        <p:spPr>
-          <a:xfrm>
-            <a:off x="1866420" y="3459995"/>
-            <a:ext cx="125950" cy="633028"/>
-          </a:xfrm>
-          <a:prstGeom prst="line">
-            <a:avLst/>
-          </a:prstGeom>
-          <a:solidFill>
-            <a:srgbClr val="3F80CD"/>
-          </a:solidFill>
-          <a:ln w="28575" cmpd="sng">
-            <a:solidFill>
-              <a:schemeClr val="bg1"/>
-            </a:solidFill>
-            <a:headEnd type="oval" w="med" len="med"/>
-          </a:ln>
-          <a:effectLst/>
-        </p:spPr>
-        <p:style>
-          <a:lnRef idx="1">
-            <a:schemeClr val="accent1"/>
-          </a:lnRef>
-          <a:fillRef idx="3">
-            <a:schemeClr val="accent1"/>
-          </a:fillRef>
-          <a:effectRef idx="2">
-            <a:schemeClr val="accent1"/>
-          </a:effectRef>
-          <a:fontRef idx="minor">
-            <a:schemeClr val="lt1"/>
-          </a:fontRef>
-        </p:style>
-      </p:cxnSp>
-      <p:sp>
-        <p:nvSpPr>
-          <p:cNvPr id="76" name="Rectangle 75"/>
-          <p:cNvSpPr/>
-          <p:nvPr/>
-        </p:nvSpPr>
-        <p:spPr>
-          <a:xfrm>
-            <a:off x="3106049" y="4923109"/>
-            <a:ext cx="920987" cy="750377"/>
-          </a:xfrm>
-          <a:prstGeom prst="rect">
-            <a:avLst/>
-          </a:prstGeom>
-          <a:solidFill>
-            <a:schemeClr val="tx1">
-              <a:lumMod val="65000"/>
-              <a:lumOff val="35000"/>
-            </a:schemeClr>
-          </a:solidFill>
-          <a:ln w="28575" cmpd="sng">
-            <a:solidFill>
-              <a:schemeClr val="bg1"/>
-            </a:solidFill>
-          </a:ln>
-          <a:effectLst/>
-        </p:spPr>
-        <p:style>
-          <a:lnRef idx="1">
-            <a:schemeClr val="accent1"/>
-          </a:lnRef>
-          <a:fillRef idx="3">
-            <a:schemeClr val="accent1"/>
-          </a:fillRef>
-          <a:effectRef idx="2">
-            <a:schemeClr val="accent1"/>
-          </a:effectRef>
-          <a:fontRef idx="minor">
-            <a:schemeClr val="lt1"/>
-          </a:fontRef>
-        </p:style>
-        <p:txBody>
-          <a:bodyPr rIns="252000" rtlCol="0" anchor="ctr"/>
-          <a:lstStyle/>
-          <a:p>
-            <a:pPr algn="ctr"/>
-            <a:endParaRPr lang="en-US" sz="1600">
-              <a:latin typeface="Open Sans"/>
-              <a:cs typeface="Open Sans"/>
-            </a:endParaRPr>
-          </a:p>
-        </p:txBody>
-      </p:sp>
-      <p:sp>
-        <p:nvSpPr>
-          <p:cNvPr id="77" name="Rectangle 76"/>
-          <p:cNvSpPr/>
-          <p:nvPr/>
-        </p:nvSpPr>
-        <p:spPr>
-          <a:xfrm>
-            <a:off x="3258449" y="5075509"/>
-            <a:ext cx="920987" cy="750377"/>
-          </a:xfrm>
-          <a:prstGeom prst="rect">
-            <a:avLst/>
-          </a:prstGeom>
-          <a:solidFill>
-            <a:schemeClr val="tx1">
-              <a:lumMod val="65000"/>
-              <a:lumOff val="35000"/>
-            </a:schemeClr>
-          </a:solidFill>
-          <a:ln w="28575" cmpd="sng">
-            <a:solidFill>
-              <a:schemeClr val="bg1"/>
-            </a:solidFill>
-          </a:ln>
-          <a:effectLst/>
-        </p:spPr>
-        <p:style>
-          <a:lnRef idx="1">
-            <a:schemeClr val="accent1"/>
-          </a:lnRef>
-          <a:fillRef idx="3">
-            <a:schemeClr val="accent1"/>
-          </a:fillRef>
-          <a:effectRef idx="2">
-            <a:schemeClr val="accent1"/>
-          </a:effectRef>
-          <a:fontRef idx="minor">
-            <a:schemeClr val="lt1"/>
-          </a:fontRef>
-        </p:style>
-        <p:txBody>
-          <a:bodyPr rIns="252000" rtlCol="0" anchor="ctr"/>
-          <a:lstStyle/>
-          <a:p>
-            <a:pPr algn="ctr"/>
-            <a:endParaRPr lang="en-US" sz="1600">
-              <a:latin typeface="Open Sans"/>
-              <a:cs typeface="Open Sans"/>
-            </a:endParaRPr>
           </a:p>
         </p:txBody>
       </p:sp>
@@ -6838,7 +6119,7 @@
         </p:nvSpPr>
         <p:spPr>
           <a:xfrm>
-            <a:off x="5027680" y="5184621"/>
+            <a:off x="7135290" y="4545112"/>
             <a:ext cx="1590514" cy="825415"/>
           </a:xfrm>
           <a:prstGeom prst="rect">
@@ -6902,9 +6183,9 @@
           <p:nvPr/>
         </p:nvCxnSpPr>
         <p:spPr>
-          <a:xfrm flipV="1">
-            <a:off x="4331836" y="5597329"/>
-            <a:ext cx="695844" cy="5769"/>
+          <a:xfrm>
+            <a:off x="4301295" y="4954169"/>
+            <a:ext cx="2833995" cy="3651"/>
           </a:xfrm>
           <a:prstGeom prst="line">
             <a:avLst/>
@@ -6945,17 +6226,14 @@
         </p:nvSpPr>
         <p:spPr>
           <a:xfrm>
-            <a:off x="3380308" y="3611294"/>
-            <a:ext cx="920987" cy="750377"/>
+            <a:off x="3380308" y="3579544"/>
+            <a:ext cx="920987" cy="813168"/>
           </a:xfrm>
           <a:prstGeom prst="rect">
             <a:avLst/>
           </a:prstGeom>
           <a:solidFill>
-            <a:schemeClr val="tx1">
-              <a:lumMod val="65000"/>
-              <a:lumOff val="35000"/>
-            </a:schemeClr>
+            <a:srgbClr val="3F80CD"/>
           </a:solidFill>
           <a:ln w="28575" cmpd="sng">
             <a:solidFill>
@@ -7052,10 +6330,7 @@
             <a:avLst/>
           </a:prstGeom>
           <a:solidFill>
-            <a:schemeClr val="tx1">
-              <a:lumMod val="65000"/>
-              <a:lumOff val="35000"/>
-            </a:schemeClr>
+            <a:srgbClr val="3F80CD"/>
           </a:solidFill>
           <a:ln w="28575" cmpd="sng">
             <a:solidFill>
@@ -7152,10 +6427,7 @@
             <a:avLst/>
           </a:prstGeom>
           <a:solidFill>
-            <a:schemeClr val="tx1">
-              <a:lumMod val="65000"/>
-              <a:lumOff val="35000"/>
-            </a:schemeClr>
+            <a:srgbClr val="3F80CD"/>
           </a:solidFill>
           <a:ln w="28575" cmpd="sng">
             <a:solidFill>
@@ -7201,8 +6473,8 @@
         </p:nvSpPr>
         <p:spPr>
           <a:xfrm rot="16200000">
-            <a:off x="2849051" y="2807654"/>
-            <a:ext cx="3682468" cy="400110"/>
+            <a:off x="3023941" y="2727970"/>
+            <a:ext cx="3332688" cy="369332"/>
           </a:xfrm>
           <a:prstGeom prst="rect">
             <a:avLst/>
@@ -7216,13 +6488,109 @@
           <a:lstStyle/>
           <a:p>
             <a:r>
-              <a:rPr lang="en-US" sz="2000"/>
-              <a:t>RockScript HTTP  </a:t>
-            </a:r>
-            <a:r>
-              <a:rPr lang="en-US" sz="2000"/>
-              <a:t>Service protocol</a:t>
-            </a:r>
+              <a:rPr lang="en-US"/>
+              <a:t>RockScript HTTP  Service protocol</a:t>
+            </a:r>
+          </a:p>
+        </p:txBody>
+      </p:sp>
+      <p:sp>
+        <p:nvSpPr>
+          <p:cNvPr id="76" name="Rectangle 75"/>
+          <p:cNvSpPr/>
+          <p:nvPr/>
+        </p:nvSpPr>
+        <p:spPr>
+          <a:xfrm>
+            <a:off x="3075508" y="4883780"/>
+            <a:ext cx="920987" cy="750377"/>
+          </a:xfrm>
+          <a:prstGeom prst="rect">
+            <a:avLst/>
+          </a:prstGeom>
+          <a:solidFill>
+            <a:srgbClr val="3F80CD"/>
+          </a:solidFill>
+          <a:ln w="28575" cmpd="sng">
+            <a:solidFill>
+              <a:schemeClr val="bg1"/>
+            </a:solidFill>
+          </a:ln>
+          <a:effectLst/>
+        </p:spPr>
+        <p:style>
+          <a:lnRef idx="1">
+            <a:schemeClr val="accent1"/>
+          </a:lnRef>
+          <a:fillRef idx="3">
+            <a:schemeClr val="accent1"/>
+          </a:fillRef>
+          <a:effectRef idx="2">
+            <a:schemeClr val="accent1"/>
+          </a:effectRef>
+          <a:fontRef idx="minor">
+            <a:schemeClr val="lt1"/>
+          </a:fontRef>
+        </p:style>
+        <p:txBody>
+          <a:bodyPr rIns="252000" rtlCol="0" anchor="ctr"/>
+          <a:lstStyle/>
+          <a:p>
+            <a:pPr algn="ctr"/>
+            <a:endParaRPr lang="en-US" sz="1600">
+              <a:latin typeface="Open Sans"/>
+              <a:cs typeface="Open Sans"/>
+            </a:endParaRPr>
+          </a:p>
+        </p:txBody>
+      </p:sp>
+      <p:sp>
+        <p:nvSpPr>
+          <p:cNvPr id="77" name="Rectangle 76"/>
+          <p:cNvSpPr/>
+          <p:nvPr/>
+        </p:nvSpPr>
+        <p:spPr>
+          <a:xfrm>
+            <a:off x="3227908" y="4731380"/>
+            <a:ext cx="920987" cy="750377"/>
+          </a:xfrm>
+          <a:prstGeom prst="rect">
+            <a:avLst/>
+          </a:prstGeom>
+          <a:solidFill>
+            <a:srgbClr val="3F80CD"/>
+          </a:solidFill>
+          <a:ln w="28575" cmpd="sng">
+            <a:solidFill>
+              <a:schemeClr val="bg1"/>
+            </a:solidFill>
+          </a:ln>
+          <a:effectLst/>
+        </p:spPr>
+        <p:style>
+          <a:lnRef idx="1">
+            <a:schemeClr val="accent1"/>
+          </a:lnRef>
+          <a:fillRef idx="3">
+            <a:schemeClr val="accent1"/>
+          </a:fillRef>
+          <a:effectRef idx="2">
+            <a:schemeClr val="accent1"/>
+          </a:effectRef>
+          <a:fontRef idx="minor">
+            <a:schemeClr val="lt1"/>
+          </a:fontRef>
+        </p:style>
+        <p:txBody>
+          <a:bodyPr rIns="252000" rtlCol="0" anchor="ctr"/>
+          <a:lstStyle/>
+          <a:p>
+            <a:pPr algn="ctr"/>
+            <a:endParaRPr lang="en-US" sz="1600">
+              <a:latin typeface="Open Sans"/>
+              <a:cs typeface="Open Sans"/>
+            </a:endParaRPr>
           </a:p>
         </p:txBody>
       </p:sp>
@@ -7234,17 +6602,14 @@
         </p:nvSpPr>
         <p:spPr>
           <a:xfrm>
-            <a:off x="3410849" y="5227909"/>
+            <a:off x="3380308" y="4578980"/>
             <a:ext cx="920987" cy="750377"/>
           </a:xfrm>
           <a:prstGeom prst="rect">
             <a:avLst/>
           </a:prstGeom>
           <a:solidFill>
-            <a:schemeClr val="tx1">
-              <a:lumMod val="65000"/>
-              <a:lumOff val="35000"/>
-            </a:schemeClr>
+            <a:srgbClr val="3F80CD"/>
           </a:solidFill>
           <a:ln w="28575" cmpd="sng">
             <a:solidFill>
@@ -7418,7 +6783,7 @@
         </p:nvSpPr>
         <p:spPr>
           <a:xfrm>
-            <a:off x="5027680" y="3573775"/>
+            <a:off x="5636218" y="3573775"/>
             <a:ext cx="1471762" cy="825415"/>
           </a:xfrm>
           <a:prstGeom prst="rect">
@@ -7475,6 +6840,84 @@
                 <a:cs typeface="Open Sans"/>
               </a:rPr>
               <a:t>Bridge</a:t>
+            </a:r>
+          </a:p>
+        </p:txBody>
+      </p:sp>
+      <p:sp>
+        <p:nvSpPr>
+          <p:cNvPr id="53" name="Rectangle 52"/>
+          <p:cNvSpPr/>
+          <p:nvPr/>
+        </p:nvSpPr>
+        <p:spPr>
+          <a:xfrm>
+            <a:off x="560470" y="1845733"/>
+            <a:ext cx="1958915" cy="337080"/>
+          </a:xfrm>
+          <a:prstGeom prst="rect">
+            <a:avLst/>
+          </a:prstGeom>
+          <a:noFill/>
+          <a:ln w="28575" cmpd="sng">
+            <a:noFill/>
+          </a:ln>
+          <a:effectLst/>
+        </p:spPr>
+        <p:style>
+          <a:lnRef idx="1">
+            <a:schemeClr val="accent1"/>
+          </a:lnRef>
+          <a:fillRef idx="3">
+            <a:schemeClr val="accent1"/>
+          </a:fillRef>
+          <a:effectRef idx="2">
+            <a:schemeClr val="accent1"/>
+          </a:effectRef>
+          <a:fontRef idx="minor">
+            <a:schemeClr val="lt1"/>
+          </a:fontRef>
+        </p:style>
+        <p:txBody>
+          <a:bodyPr rtlCol="0" anchor="ctr"/>
+          <a:lstStyle/>
+          <a:p>
+            <a:pPr algn="ctr"/>
+            <a:r>
+              <a:rPr lang="en-US" sz="1400">
+                <a:latin typeface="Open Sans"/>
+                <a:cs typeface="Open Sans"/>
+              </a:rPr>
+              <a:t>Script</a:t>
+            </a:r>
+          </a:p>
+        </p:txBody>
+      </p:sp>
+      <p:sp>
+        <p:nvSpPr>
+          <p:cNvPr id="54" name="TextBox 53"/>
+          <p:cNvSpPr txBox="1"/>
+          <p:nvPr/>
+        </p:nvSpPr>
+        <p:spPr>
+          <a:xfrm>
+            <a:off x="5036147" y="4631378"/>
+            <a:ext cx="1256975" cy="338554"/>
+          </a:xfrm>
+          <a:prstGeom prst="rect">
+            <a:avLst/>
+          </a:prstGeom>
+          <a:noFill/>
+        </p:spPr>
+        <p:txBody>
+          <a:bodyPr wrap="none" rtlCol="0">
+            <a:spAutoFit/>
+          </a:bodyPr>
+          <a:lstStyle/>
+          <a:p>
+            <a:r>
+              <a:rPr lang="en-US" sz="1600"/>
+              <a:t>Any protocol</a:t>
             </a:r>
           </a:p>
         </p:txBody>

</xml_diff>

<commit_message>
Renamed name to scriptName in save command and docs progress
</commit_message>
<xml_diff>
--- a/docs/diagrams.pptx
+++ b/docs/diagrams.pptx
@@ -5,12 +5,14 @@
     <p:sldMasterId id="2147483648" r:id="rId1"/>
   </p:sldMasterIdLst>
   <p:notesMasterIdLst>
-    <p:notesMasterId r:id="rId5"/>
+    <p:notesMasterId r:id="rId7"/>
   </p:notesMasterIdLst>
   <p:sldIdLst>
     <p:sldId id="264" r:id="rId2"/>
     <p:sldId id="265" r:id="rId3"/>
     <p:sldId id="266" r:id="rId4"/>
+    <p:sldId id="268" r:id="rId5"/>
+    <p:sldId id="269" r:id="rId6"/>
   </p:sldIdLst>
   <p:sldSz cx="9144000" cy="6858000" type="screen4x3"/>
   <p:notesSz cx="6858000" cy="9144000"/>
@@ -193,7 +195,7 @@
           </a:lstStyle>
           <a:p>
             <a:fld id="{AB2E4302-E9AB-0549-A672-F7D42312B8D1}" type="datetimeFigureOut">
-              <a:t>29/11/17</a:t>
+              <a:t>06/12/17</a:t>
             </a:fld>
             <a:endParaRPr lang="en-US"/>
           </a:p>
@@ -1135,7 +1137,7 @@
           <a:lstStyle/>
           <a:p>
             <a:fld id="{E69A878D-89FF-BF47-B66F-1617CBC883C6}" type="datetimeFigureOut">
-              <a:t>29/11/17</a:t>
+              <a:t>06/12/17</a:t>
             </a:fld>
             <a:endParaRPr lang="en-US"/>
           </a:p>
@@ -1327,7 +1329,7 @@
           <a:lstStyle/>
           <a:p>
             <a:fld id="{E69A878D-89FF-BF47-B66F-1617CBC883C6}" type="datetimeFigureOut">
-              <a:t>29/11/17</a:t>
+              <a:t>06/12/17</a:t>
             </a:fld>
             <a:endParaRPr lang="en-US"/>
           </a:p>
@@ -1957,7 +1959,7 @@
           <a:lstStyle/>
           <a:p>
             <a:fld id="{E69A878D-89FF-BF47-B66F-1617CBC883C6}" type="datetimeFigureOut">
-              <a:t>29/11/17</a:t>
+              <a:t>06/12/17</a:t>
             </a:fld>
             <a:endParaRPr lang="en-US"/>
           </a:p>
@@ -2390,7 +2392,7 @@
           <a:lstStyle/>
           <a:p>
             <a:fld id="{E69A878D-89FF-BF47-B66F-1617CBC883C6}" type="datetimeFigureOut">
-              <a:t>29/11/17</a:t>
+              <a:t>06/12/17</a:t>
             </a:fld>
             <a:endParaRPr lang="en-US"/>
           </a:p>
@@ -2521,7 +2523,7 @@
           <a:lstStyle/>
           <a:p>
             <a:fld id="{E69A878D-89FF-BF47-B66F-1617CBC883C6}" type="datetimeFigureOut">
-              <a:t>29/11/17</a:t>
+              <a:t>06/12/17</a:t>
             </a:fld>
             <a:endParaRPr lang="en-US"/>
           </a:p>
@@ -2630,7 +2632,7 @@
           <a:lstStyle/>
           <a:p>
             <a:fld id="{E69A878D-89FF-BF47-B66F-1617CBC883C6}" type="datetimeFigureOut">
-              <a:t>29/11/17</a:t>
+              <a:t>06/12/17</a:t>
             </a:fld>
             <a:endParaRPr lang="en-US"/>
           </a:p>
@@ -2919,7 +2921,7 @@
           <a:lstStyle/>
           <a:p>
             <a:fld id="{E69A878D-89FF-BF47-B66F-1617CBC883C6}" type="datetimeFigureOut">
-              <a:t>29/11/17</a:t>
+              <a:t>06/12/17</a:t>
             </a:fld>
             <a:endParaRPr lang="en-US"/>
           </a:p>
@@ -3185,7 +3187,7 @@
           <a:lstStyle/>
           <a:p>
             <a:fld id="{E69A878D-89FF-BF47-B66F-1617CBC883C6}" type="datetimeFigureOut">
-              <a:t>29/11/17</a:t>
+              <a:t>06/12/17</a:t>
             </a:fld>
             <a:endParaRPr lang="en-US"/>
           </a:p>
@@ -3808,7 +3810,7 @@
         </p:nvSpPr>
         <p:spPr>
           <a:xfrm>
-            <a:off x="291654" y="723690"/>
+            <a:off x="325331" y="750514"/>
             <a:ext cx="4164897" cy="5721559"/>
           </a:xfrm>
           <a:prstGeom prst="rect">
@@ -8266,6 +8268,1497 @@
       </p:par>
     </p:tnLst>
   </p:timing>
+</p:sld>
+</file>
+
+<file path=ppt/slides/slide4.xml><?xml version="1.0" encoding="utf-8"?>
+<p:sld xmlns:a="http://schemas.openxmlformats.org/drawingml/2006/main" xmlns:r="http://schemas.openxmlformats.org/officeDocument/2006/relationships" xmlns:p="http://schemas.openxmlformats.org/presentationml/2006/main">
+  <p:cSld>
+    <p:spTree>
+      <p:nvGrpSpPr>
+        <p:cNvPr id="1" name=""/>
+        <p:cNvGrpSpPr/>
+        <p:nvPr/>
+      </p:nvGrpSpPr>
+      <p:grpSpPr>
+        <a:xfrm>
+          <a:off x="0" y="0"/>
+          <a:ext cx="0" cy="0"/>
+          <a:chOff x="0" y="0"/>
+          <a:chExt cx="0" cy="0"/>
+        </a:xfrm>
+      </p:grpSpPr>
+      <p:sp>
+        <p:nvSpPr>
+          <p:cNvPr id="35" name="Rectangle 34"/>
+          <p:cNvSpPr/>
+          <p:nvPr/>
+        </p:nvSpPr>
+        <p:spPr>
+          <a:xfrm>
+            <a:off x="3779578" y="4657676"/>
+            <a:ext cx="99659" cy="625523"/>
+          </a:xfrm>
+          <a:prstGeom prst="rect">
+            <a:avLst/>
+          </a:prstGeom>
+          <a:solidFill>
+            <a:srgbClr val="3F80CD"/>
+          </a:solidFill>
+          <a:ln>
+            <a:noFill/>
+          </a:ln>
+          <a:effectLst/>
+        </p:spPr>
+        <p:style>
+          <a:lnRef idx="1">
+            <a:schemeClr val="accent1"/>
+          </a:lnRef>
+          <a:fillRef idx="3">
+            <a:schemeClr val="accent1"/>
+          </a:fillRef>
+          <a:effectRef idx="2">
+            <a:schemeClr val="accent1"/>
+          </a:effectRef>
+          <a:fontRef idx="minor">
+            <a:schemeClr val="lt1"/>
+          </a:fontRef>
+        </p:style>
+        <p:txBody>
+          <a:bodyPr tIns="140400" rtlCol="0" anchor="t"/>
+          <a:lstStyle/>
+          <a:p>
+            <a:pPr algn="ctr"/>
+            <a:endParaRPr lang="en-US" sz="1600">
+              <a:latin typeface="Open Sans"/>
+              <a:cs typeface="Open Sans"/>
+            </a:endParaRPr>
+          </a:p>
+        </p:txBody>
+      </p:sp>
+      <p:sp>
+        <p:nvSpPr>
+          <p:cNvPr id="34" name="Rectangle 33"/>
+          <p:cNvSpPr/>
+          <p:nvPr/>
+        </p:nvSpPr>
+        <p:spPr>
+          <a:xfrm>
+            <a:off x="3776059" y="2201075"/>
+            <a:ext cx="103178" cy="727597"/>
+          </a:xfrm>
+          <a:prstGeom prst="rect">
+            <a:avLst/>
+          </a:prstGeom>
+          <a:solidFill>
+            <a:srgbClr val="3F80CD"/>
+          </a:solidFill>
+          <a:ln>
+            <a:noFill/>
+          </a:ln>
+          <a:effectLst/>
+        </p:spPr>
+        <p:style>
+          <a:lnRef idx="1">
+            <a:schemeClr val="accent1"/>
+          </a:lnRef>
+          <a:fillRef idx="3">
+            <a:schemeClr val="accent1"/>
+          </a:fillRef>
+          <a:effectRef idx="2">
+            <a:schemeClr val="accent1"/>
+          </a:effectRef>
+          <a:fontRef idx="minor">
+            <a:schemeClr val="lt1"/>
+          </a:fontRef>
+        </p:style>
+        <p:txBody>
+          <a:bodyPr tIns="140400" rtlCol="0" anchor="t"/>
+          <a:lstStyle/>
+          <a:p>
+            <a:pPr algn="ctr"/>
+            <a:endParaRPr lang="en-US" sz="1600">
+              <a:latin typeface="Open Sans"/>
+              <a:cs typeface="Open Sans"/>
+            </a:endParaRPr>
+          </a:p>
+        </p:txBody>
+      </p:sp>
+      <p:cxnSp>
+        <p:nvCxnSpPr>
+          <p:cNvPr id="6" name="Straight Connector 5"/>
+          <p:cNvCxnSpPr/>
+          <p:nvPr/>
+        </p:nvCxnSpPr>
+        <p:spPr>
+          <a:xfrm>
+            <a:off x="3831167" y="2918400"/>
+            <a:ext cx="4080876" cy="10272"/>
+          </a:xfrm>
+          <a:prstGeom prst="line">
+            <a:avLst/>
+          </a:prstGeom>
+          <a:solidFill>
+            <a:srgbClr val="3F80CD"/>
+          </a:solidFill>
+          <a:ln w="38100" cmpd="sng">
+            <a:solidFill>
+              <a:schemeClr val="tx1">
+                <a:lumMod val="65000"/>
+                <a:lumOff val="35000"/>
+              </a:schemeClr>
+            </a:solidFill>
+            <a:headEnd type="oval" w="lg" len="lg"/>
+            <a:tailEnd type="arrow" w="lg" len="lg"/>
+          </a:ln>
+          <a:effectLst/>
+        </p:spPr>
+        <p:style>
+          <a:lnRef idx="1">
+            <a:schemeClr val="accent1"/>
+          </a:lnRef>
+          <a:fillRef idx="3">
+            <a:schemeClr val="accent1"/>
+          </a:fillRef>
+          <a:effectRef idx="2">
+            <a:schemeClr val="accent1"/>
+          </a:effectRef>
+          <a:fontRef idx="minor">
+            <a:schemeClr val="lt1"/>
+          </a:fontRef>
+        </p:style>
+      </p:cxnSp>
+      <p:cxnSp>
+        <p:nvCxnSpPr>
+          <p:cNvPr id="7" name="Straight Connector 6"/>
+          <p:cNvCxnSpPr>
+            <a:stCxn id="5" idx="2"/>
+          </p:cNvCxnSpPr>
+          <p:nvPr/>
+        </p:nvCxnSpPr>
+        <p:spPr>
+          <a:xfrm>
+            <a:off x="3831167" y="1286933"/>
+            <a:ext cx="0" cy="3996266"/>
+          </a:xfrm>
+          <a:prstGeom prst="line">
+            <a:avLst/>
+          </a:prstGeom>
+          <a:solidFill>
+            <a:srgbClr val="3F80CD"/>
+          </a:solidFill>
+          <a:ln w="28575" cmpd="sng">
+            <a:solidFill>
+              <a:schemeClr val="bg1">
+                <a:lumMod val="75000"/>
+              </a:schemeClr>
+            </a:solidFill>
+            <a:prstDash val="lgDash"/>
+            <a:headEnd type="oval" w="lg" len="lg"/>
+          </a:ln>
+          <a:effectLst/>
+        </p:spPr>
+        <p:style>
+          <a:lnRef idx="1">
+            <a:schemeClr val="accent1"/>
+          </a:lnRef>
+          <a:fillRef idx="3">
+            <a:schemeClr val="accent1"/>
+          </a:fillRef>
+          <a:effectRef idx="2">
+            <a:schemeClr val="accent1"/>
+          </a:effectRef>
+          <a:fontRef idx="minor">
+            <a:schemeClr val="lt1"/>
+          </a:fontRef>
+        </p:style>
+      </p:cxnSp>
+      <p:cxnSp>
+        <p:nvCxnSpPr>
+          <p:cNvPr id="10" name="Straight Connector 9"/>
+          <p:cNvCxnSpPr>
+            <a:stCxn id="4" idx="2"/>
+          </p:cNvCxnSpPr>
+          <p:nvPr/>
+        </p:nvCxnSpPr>
+        <p:spPr>
+          <a:xfrm>
+            <a:off x="7901444" y="1286934"/>
+            <a:ext cx="0" cy="3996266"/>
+          </a:xfrm>
+          <a:prstGeom prst="line">
+            <a:avLst/>
+          </a:prstGeom>
+          <a:solidFill>
+            <a:srgbClr val="3F80CD"/>
+          </a:solidFill>
+          <a:ln w="28575" cmpd="sng">
+            <a:solidFill>
+              <a:schemeClr val="bg1">
+                <a:lumMod val="75000"/>
+              </a:schemeClr>
+            </a:solidFill>
+            <a:prstDash val="lgDash"/>
+            <a:headEnd type="oval" w="lg" len="lg"/>
+          </a:ln>
+          <a:effectLst/>
+        </p:spPr>
+        <p:style>
+          <a:lnRef idx="1">
+            <a:schemeClr val="accent1"/>
+          </a:lnRef>
+          <a:fillRef idx="3">
+            <a:schemeClr val="accent1"/>
+          </a:fillRef>
+          <a:effectRef idx="2">
+            <a:schemeClr val="accent1"/>
+          </a:effectRef>
+          <a:fontRef idx="minor">
+            <a:schemeClr val="lt1"/>
+          </a:fontRef>
+        </p:style>
+      </p:cxnSp>
+      <p:cxnSp>
+        <p:nvCxnSpPr>
+          <p:cNvPr id="16" name="Straight Connector 15"/>
+          <p:cNvCxnSpPr/>
+          <p:nvPr/>
+        </p:nvCxnSpPr>
+        <p:spPr>
+          <a:xfrm flipH="1" flipV="1">
+            <a:off x="3879237" y="4652215"/>
+            <a:ext cx="4029288" cy="5462"/>
+          </a:xfrm>
+          <a:prstGeom prst="line">
+            <a:avLst/>
+          </a:prstGeom>
+          <a:solidFill>
+            <a:srgbClr val="3F80CD"/>
+          </a:solidFill>
+          <a:ln w="38100" cmpd="sng">
+            <a:solidFill>
+              <a:schemeClr val="tx1">
+                <a:lumMod val="65000"/>
+                <a:lumOff val="35000"/>
+              </a:schemeClr>
+            </a:solidFill>
+            <a:headEnd type="oval" w="lg" len="lg"/>
+            <a:tailEnd type="arrow" w="lg" len="lg"/>
+          </a:ln>
+          <a:effectLst/>
+        </p:spPr>
+        <p:style>
+          <a:lnRef idx="1">
+            <a:schemeClr val="accent1"/>
+          </a:lnRef>
+          <a:fillRef idx="3">
+            <a:schemeClr val="accent1"/>
+          </a:fillRef>
+          <a:effectRef idx="2">
+            <a:schemeClr val="accent1"/>
+          </a:effectRef>
+          <a:fontRef idx="minor">
+            <a:schemeClr val="lt1"/>
+          </a:fontRef>
+        </p:style>
+      </p:cxnSp>
+      <p:sp>
+        <p:nvSpPr>
+          <p:cNvPr id="4" name="Rectangle 3"/>
+          <p:cNvSpPr/>
+          <p:nvPr/>
+        </p:nvSpPr>
+        <p:spPr>
+          <a:xfrm>
+            <a:off x="6787317" y="725115"/>
+            <a:ext cx="2228253" cy="561819"/>
+          </a:xfrm>
+          <a:prstGeom prst="rect">
+            <a:avLst/>
+          </a:prstGeom>
+          <a:solidFill>
+            <a:srgbClr val="DD5E17"/>
+          </a:solidFill>
+          <a:ln>
+            <a:noFill/>
+          </a:ln>
+          <a:effectLst/>
+        </p:spPr>
+        <p:style>
+          <a:lnRef idx="1">
+            <a:schemeClr val="accent1"/>
+          </a:lnRef>
+          <a:fillRef idx="3">
+            <a:schemeClr val="accent1"/>
+          </a:fillRef>
+          <a:effectRef idx="2">
+            <a:schemeClr val="accent1"/>
+          </a:effectRef>
+          <a:fontRef idx="minor">
+            <a:schemeClr val="lt1"/>
+          </a:fontRef>
+        </p:style>
+        <p:txBody>
+          <a:bodyPr tIns="140400" rtlCol="0" anchor="t"/>
+          <a:lstStyle/>
+          <a:p>
+            <a:pPr algn="ctr"/>
+            <a:r>
+              <a:rPr lang="en-US" sz="1600">
+                <a:latin typeface="Open Sans"/>
+                <a:cs typeface="Open Sans"/>
+              </a:rPr>
+              <a:t>Service Bridge</a:t>
+            </a:r>
+          </a:p>
+        </p:txBody>
+      </p:sp>
+      <p:sp>
+        <p:nvSpPr>
+          <p:cNvPr id="5" name="Rectangle 4"/>
+          <p:cNvSpPr/>
+          <p:nvPr/>
+        </p:nvSpPr>
+        <p:spPr>
+          <a:xfrm>
+            <a:off x="2681499" y="725115"/>
+            <a:ext cx="2299336" cy="561818"/>
+          </a:xfrm>
+          <a:prstGeom prst="rect">
+            <a:avLst/>
+          </a:prstGeom>
+          <a:solidFill>
+            <a:srgbClr val="3F80CD"/>
+          </a:solidFill>
+          <a:ln>
+            <a:noFill/>
+          </a:ln>
+          <a:effectLst/>
+        </p:spPr>
+        <p:style>
+          <a:lnRef idx="1">
+            <a:schemeClr val="accent1"/>
+          </a:lnRef>
+          <a:fillRef idx="3">
+            <a:schemeClr val="accent1"/>
+          </a:fillRef>
+          <a:effectRef idx="2">
+            <a:schemeClr val="accent1"/>
+          </a:effectRef>
+          <a:fontRef idx="minor">
+            <a:schemeClr val="lt1"/>
+          </a:fontRef>
+        </p:style>
+        <p:txBody>
+          <a:bodyPr tIns="140400" rtlCol="0" anchor="t"/>
+          <a:lstStyle/>
+          <a:p>
+            <a:pPr algn="ctr"/>
+            <a:r>
+              <a:rPr lang="en-US" sz="1600">
+                <a:latin typeface="Open Sans"/>
+                <a:cs typeface="Open Sans"/>
+              </a:rPr>
+              <a:t>RockScript Server</a:t>
+            </a:r>
+          </a:p>
+        </p:txBody>
+      </p:sp>
+      <p:cxnSp>
+        <p:nvCxnSpPr>
+          <p:cNvPr id="25" name="Straight Connector 24"/>
+          <p:cNvCxnSpPr>
+            <a:stCxn id="23" idx="2"/>
+          </p:cNvCxnSpPr>
+          <p:nvPr/>
+        </p:nvCxnSpPr>
+        <p:spPr>
+          <a:xfrm>
+            <a:off x="1285903" y="1286933"/>
+            <a:ext cx="0" cy="3996267"/>
+          </a:xfrm>
+          <a:prstGeom prst="line">
+            <a:avLst/>
+          </a:prstGeom>
+          <a:solidFill>
+            <a:srgbClr val="3F80CD"/>
+          </a:solidFill>
+          <a:ln w="28575" cmpd="sng">
+            <a:solidFill>
+              <a:schemeClr val="bg1">
+                <a:lumMod val="75000"/>
+              </a:schemeClr>
+            </a:solidFill>
+            <a:prstDash val="lgDash"/>
+            <a:headEnd type="oval" w="lg" len="lg"/>
+          </a:ln>
+          <a:effectLst/>
+        </p:spPr>
+        <p:style>
+          <a:lnRef idx="1">
+            <a:schemeClr val="accent1"/>
+          </a:lnRef>
+          <a:fillRef idx="3">
+            <a:schemeClr val="accent1"/>
+          </a:fillRef>
+          <a:effectRef idx="2">
+            <a:schemeClr val="accent1"/>
+          </a:effectRef>
+          <a:fontRef idx="minor">
+            <a:schemeClr val="lt1"/>
+          </a:fontRef>
+        </p:style>
+      </p:cxnSp>
+      <p:sp>
+        <p:nvSpPr>
+          <p:cNvPr id="23" name="Rectangle 22"/>
+          <p:cNvSpPr/>
+          <p:nvPr/>
+        </p:nvSpPr>
+        <p:spPr>
+          <a:xfrm>
+            <a:off x="136235" y="725115"/>
+            <a:ext cx="2299336" cy="561818"/>
+          </a:xfrm>
+          <a:prstGeom prst="rect">
+            <a:avLst/>
+          </a:prstGeom>
+          <a:solidFill>
+            <a:schemeClr val="tx1">
+              <a:lumMod val="65000"/>
+              <a:lumOff val="35000"/>
+            </a:schemeClr>
+          </a:solidFill>
+          <a:ln>
+            <a:noFill/>
+          </a:ln>
+          <a:effectLst/>
+        </p:spPr>
+        <p:style>
+          <a:lnRef idx="1">
+            <a:schemeClr val="accent1"/>
+          </a:lnRef>
+          <a:fillRef idx="3">
+            <a:schemeClr val="accent1"/>
+          </a:fillRef>
+          <a:effectRef idx="2">
+            <a:schemeClr val="accent1"/>
+          </a:effectRef>
+          <a:fontRef idx="minor">
+            <a:schemeClr val="lt1"/>
+          </a:fontRef>
+        </p:style>
+        <p:txBody>
+          <a:bodyPr tIns="140400" rtlCol="0" anchor="t"/>
+          <a:lstStyle/>
+          <a:p>
+            <a:pPr algn="ctr"/>
+            <a:r>
+              <a:rPr lang="en-US" sz="1600">
+                <a:latin typeface="Open Sans"/>
+                <a:cs typeface="Open Sans"/>
+              </a:rPr>
+              <a:t>RockScript API user</a:t>
+            </a:r>
+          </a:p>
+        </p:txBody>
+      </p:sp>
+      <p:cxnSp>
+        <p:nvCxnSpPr>
+          <p:cNvPr id="24" name="Straight Connector 23"/>
+          <p:cNvCxnSpPr/>
+          <p:nvPr/>
+        </p:nvCxnSpPr>
+        <p:spPr>
+          <a:xfrm flipV="1">
+            <a:off x="1285903" y="2175655"/>
+            <a:ext cx="2545264" cy="24625"/>
+          </a:xfrm>
+          <a:prstGeom prst="line">
+            <a:avLst/>
+          </a:prstGeom>
+          <a:solidFill>
+            <a:srgbClr val="3F80CD"/>
+          </a:solidFill>
+          <a:ln w="38100" cmpd="sng">
+            <a:solidFill>
+              <a:schemeClr val="tx1">
+                <a:lumMod val="65000"/>
+                <a:lumOff val="35000"/>
+              </a:schemeClr>
+            </a:solidFill>
+            <a:headEnd type="oval" w="lg" len="lg"/>
+            <a:tailEnd type="arrow" w="lg" len="lg"/>
+          </a:ln>
+          <a:effectLst/>
+        </p:spPr>
+        <p:style>
+          <a:lnRef idx="1">
+            <a:schemeClr val="accent1"/>
+          </a:lnRef>
+          <a:fillRef idx="3">
+            <a:schemeClr val="accent1"/>
+          </a:fillRef>
+          <a:effectRef idx="2">
+            <a:schemeClr val="accent1"/>
+          </a:effectRef>
+          <a:fontRef idx="minor">
+            <a:schemeClr val="lt1"/>
+          </a:fontRef>
+        </p:style>
+      </p:cxnSp>
+      <p:sp>
+        <p:nvSpPr>
+          <p:cNvPr id="27" name="TextBox 26"/>
+          <p:cNvSpPr txBox="1"/>
+          <p:nvPr/>
+        </p:nvSpPr>
+        <p:spPr>
+          <a:xfrm>
+            <a:off x="1359984" y="1462411"/>
+            <a:ext cx="2351926" cy="738664"/>
+          </a:xfrm>
+          <a:prstGeom prst="rect">
+            <a:avLst/>
+          </a:prstGeom>
+          <a:noFill/>
+        </p:spPr>
+        <p:txBody>
+          <a:bodyPr wrap="none" rtlCol="0">
+            <a:spAutoFit/>
+          </a:bodyPr>
+          <a:lstStyle/>
+          <a:p>
+            <a:pPr algn="ctr"/>
+            <a:r>
+              <a:rPr lang="en-US" sz="1400" spc="-20">
+                <a:latin typeface="Open Sans"/>
+                <a:cs typeface="Open Sans"/>
+              </a:rPr>
+              <a:t>Hey RockScript Server, </a:t>
+            </a:r>
+          </a:p>
+          <a:p>
+            <a:pPr algn="ctr"/>
+            <a:r>
+              <a:rPr lang="en-US" sz="1400" spc="-20">
+                <a:latin typeface="Open Sans"/>
+                <a:cs typeface="Open Sans"/>
+              </a:rPr>
+              <a:t>Can you start an execution </a:t>
+            </a:r>
+          </a:p>
+          <a:p>
+            <a:pPr algn="ctr"/>
+            <a:r>
+              <a:rPr lang="en-US" sz="1400" spc="-20">
+                <a:latin typeface="Open Sans"/>
+                <a:cs typeface="Open Sans"/>
+              </a:rPr>
+              <a:t>of this script for me?</a:t>
+            </a:r>
+          </a:p>
+        </p:txBody>
+      </p:sp>
+      <p:sp>
+        <p:nvSpPr>
+          <p:cNvPr id="28" name="TextBox 27"/>
+          <p:cNvSpPr txBox="1"/>
+          <p:nvPr/>
+        </p:nvSpPr>
+        <p:spPr>
+          <a:xfrm>
+            <a:off x="4692312" y="2200280"/>
+            <a:ext cx="2403541" cy="738664"/>
+          </a:xfrm>
+          <a:prstGeom prst="rect">
+            <a:avLst/>
+          </a:prstGeom>
+          <a:noFill/>
+        </p:spPr>
+        <p:txBody>
+          <a:bodyPr wrap="none" rtlCol="0">
+            <a:spAutoFit/>
+          </a:bodyPr>
+          <a:lstStyle/>
+          <a:p>
+            <a:pPr algn="ctr"/>
+            <a:r>
+              <a:rPr lang="en-US" sz="1400" spc="-20">
+                <a:latin typeface="Open Sans"/>
+                <a:cs typeface="Open Sans"/>
+              </a:rPr>
+              <a:t>Hey Service Bridge, </a:t>
+            </a:r>
+          </a:p>
+          <a:p>
+            <a:pPr algn="ctr"/>
+            <a:r>
+              <a:rPr lang="en-US" sz="1400" spc="-20">
+                <a:latin typeface="Open Sans"/>
+                <a:cs typeface="Open Sans"/>
+              </a:rPr>
+              <a:t>Can you perform this </a:t>
+            </a:r>
+          </a:p>
+          <a:p>
+            <a:pPr algn="ctr"/>
+            <a:r>
+              <a:rPr lang="en-US" sz="1400" spc="-20">
+                <a:latin typeface="Open Sans"/>
+                <a:cs typeface="Open Sans"/>
+              </a:rPr>
+              <a:t>function invocation for me?</a:t>
+            </a:r>
+          </a:p>
+        </p:txBody>
+      </p:sp>
+      <p:sp>
+        <p:nvSpPr>
+          <p:cNvPr id="29" name="TextBox 28"/>
+          <p:cNvSpPr txBox="1"/>
+          <p:nvPr/>
+        </p:nvSpPr>
+        <p:spPr>
+          <a:xfrm>
+            <a:off x="4078855" y="2961790"/>
+            <a:ext cx="3617284" cy="523220"/>
+          </a:xfrm>
+          <a:prstGeom prst="rect">
+            <a:avLst/>
+          </a:prstGeom>
+          <a:noFill/>
+        </p:spPr>
+        <p:txBody>
+          <a:bodyPr wrap="square" rtlCol="0">
+            <a:spAutoFit/>
+          </a:bodyPr>
+          <a:lstStyle/>
+          <a:p>
+            <a:pPr algn="ctr"/>
+            <a:r>
+              <a:rPr lang="en-US" sz="1400" spc="-20">
+                <a:latin typeface="Open Sans"/>
+                <a:cs typeface="Open Sans"/>
+              </a:rPr>
+              <a:t>Sure RockScript Server, I'll call </a:t>
+            </a:r>
+            <a:br>
+              <a:rPr lang="en-US" sz="1400" spc="-20">
+                <a:latin typeface="Open Sans"/>
+                <a:cs typeface="Open Sans"/>
+              </a:rPr>
+            </a:br>
+            <a:r>
+              <a:rPr lang="en-US" sz="1400" spc="-20">
+                <a:latin typeface="Open Sans"/>
+                <a:cs typeface="Open Sans"/>
+              </a:rPr>
+              <a:t>you back when I'm done</a:t>
+            </a:r>
+          </a:p>
+        </p:txBody>
+      </p:sp>
+      <p:sp>
+        <p:nvSpPr>
+          <p:cNvPr id="31" name="TextBox 30"/>
+          <p:cNvSpPr txBox="1"/>
+          <p:nvPr/>
+        </p:nvSpPr>
+        <p:spPr>
+          <a:xfrm>
+            <a:off x="4692312" y="3913552"/>
+            <a:ext cx="2390398" cy="738664"/>
+          </a:xfrm>
+          <a:prstGeom prst="rect">
+            <a:avLst/>
+          </a:prstGeom>
+          <a:noFill/>
+        </p:spPr>
+        <p:txBody>
+          <a:bodyPr wrap="none" rtlCol="0">
+            <a:spAutoFit/>
+          </a:bodyPr>
+          <a:lstStyle/>
+          <a:p>
+            <a:pPr algn="ctr"/>
+            <a:r>
+              <a:rPr lang="en-US" sz="1400" spc="-20">
+                <a:latin typeface="Open Sans"/>
+                <a:cs typeface="Open Sans"/>
+              </a:rPr>
+              <a:t>Hey RockScript Server, This </a:t>
+            </a:r>
+          </a:p>
+          <a:p>
+            <a:pPr algn="ctr"/>
+            <a:r>
+              <a:rPr lang="en-US" sz="1400" spc="-20">
+                <a:latin typeface="Open Sans"/>
+                <a:cs typeface="Open Sans"/>
+              </a:rPr>
+              <a:t>function invocation is done </a:t>
+            </a:r>
+          </a:p>
+          <a:p>
+            <a:pPr algn="ctr"/>
+            <a:r>
+              <a:rPr lang="en-US" sz="1400" spc="-20">
+                <a:latin typeface="Open Sans"/>
+                <a:cs typeface="Open Sans"/>
+              </a:rPr>
+              <a:t>and here's the return value</a:t>
+            </a:r>
+          </a:p>
+        </p:txBody>
+      </p:sp>
+      <p:sp>
+        <p:nvSpPr>
+          <p:cNvPr id="32" name="TextBox 31"/>
+          <p:cNvSpPr txBox="1"/>
+          <p:nvPr/>
+        </p:nvSpPr>
+        <p:spPr>
+          <a:xfrm>
+            <a:off x="4078855" y="4680523"/>
+            <a:ext cx="3617284" cy="523220"/>
+          </a:xfrm>
+          <a:prstGeom prst="rect">
+            <a:avLst/>
+          </a:prstGeom>
+          <a:noFill/>
+        </p:spPr>
+        <p:txBody>
+          <a:bodyPr wrap="square" rtlCol="0">
+            <a:spAutoFit/>
+          </a:bodyPr>
+          <a:lstStyle/>
+          <a:p>
+            <a:pPr algn="ctr"/>
+            <a:r>
+              <a:rPr lang="en-US" sz="1400" spc="-20">
+                <a:latin typeface="Open Sans"/>
+                <a:cs typeface="Open Sans"/>
+              </a:rPr>
+              <a:t>Thanks! I'll use the return value to continue the script execution. </a:t>
+            </a:r>
+          </a:p>
+        </p:txBody>
+      </p:sp>
+    </p:spTree>
+    <p:extLst>
+      <p:ext uri="{BB962C8B-B14F-4D97-AF65-F5344CB8AC3E}">
+        <p14:creationId xmlns:p14="http://schemas.microsoft.com/office/powerpoint/2010/main" val="3280300519"/>
+      </p:ext>
+    </p:extLst>
+  </p:cSld>
+  <p:clrMapOvr>
+    <a:masterClrMapping/>
+  </p:clrMapOvr>
+</p:sld>
+</file>
+
+<file path=ppt/slides/slide5.xml><?xml version="1.0" encoding="utf-8"?>
+<p:sld xmlns:a="http://schemas.openxmlformats.org/drawingml/2006/main" xmlns:r="http://schemas.openxmlformats.org/officeDocument/2006/relationships" xmlns:p="http://schemas.openxmlformats.org/presentationml/2006/main">
+  <p:cSld>
+    <p:spTree>
+      <p:nvGrpSpPr>
+        <p:cNvPr id="1" name=""/>
+        <p:cNvGrpSpPr/>
+        <p:nvPr/>
+      </p:nvGrpSpPr>
+      <p:grpSpPr>
+        <a:xfrm>
+          <a:off x="0" y="0"/>
+          <a:ext cx="0" cy="0"/>
+          <a:chOff x="0" y="0"/>
+          <a:chExt cx="0" cy="0"/>
+        </a:xfrm>
+      </p:grpSpPr>
+      <p:sp>
+        <p:nvSpPr>
+          <p:cNvPr id="35" name="Rectangle 34"/>
+          <p:cNvSpPr/>
+          <p:nvPr/>
+        </p:nvSpPr>
+        <p:spPr>
+          <a:xfrm>
+            <a:off x="3779578" y="4657676"/>
+            <a:ext cx="99659" cy="625523"/>
+          </a:xfrm>
+          <a:prstGeom prst="rect">
+            <a:avLst/>
+          </a:prstGeom>
+          <a:solidFill>
+            <a:srgbClr val="3F80CD"/>
+          </a:solidFill>
+          <a:ln>
+            <a:noFill/>
+          </a:ln>
+          <a:effectLst/>
+        </p:spPr>
+        <p:style>
+          <a:lnRef idx="1">
+            <a:schemeClr val="accent1"/>
+          </a:lnRef>
+          <a:fillRef idx="3">
+            <a:schemeClr val="accent1"/>
+          </a:fillRef>
+          <a:effectRef idx="2">
+            <a:schemeClr val="accent1"/>
+          </a:effectRef>
+          <a:fontRef idx="minor">
+            <a:schemeClr val="lt1"/>
+          </a:fontRef>
+        </p:style>
+        <p:txBody>
+          <a:bodyPr tIns="140400" rtlCol="0" anchor="t"/>
+          <a:lstStyle/>
+          <a:p>
+            <a:pPr algn="ctr"/>
+            <a:endParaRPr lang="en-US" sz="1600">
+              <a:latin typeface="Open Sans"/>
+              <a:cs typeface="Open Sans"/>
+            </a:endParaRPr>
+          </a:p>
+        </p:txBody>
+      </p:sp>
+      <p:sp>
+        <p:nvSpPr>
+          <p:cNvPr id="34" name="Rectangle 33"/>
+          <p:cNvSpPr/>
+          <p:nvPr/>
+        </p:nvSpPr>
+        <p:spPr>
+          <a:xfrm>
+            <a:off x="3776059" y="2201075"/>
+            <a:ext cx="103178" cy="727597"/>
+          </a:xfrm>
+          <a:prstGeom prst="rect">
+            <a:avLst/>
+          </a:prstGeom>
+          <a:solidFill>
+            <a:srgbClr val="3F80CD"/>
+          </a:solidFill>
+          <a:ln>
+            <a:noFill/>
+          </a:ln>
+          <a:effectLst/>
+        </p:spPr>
+        <p:style>
+          <a:lnRef idx="1">
+            <a:schemeClr val="accent1"/>
+          </a:lnRef>
+          <a:fillRef idx="3">
+            <a:schemeClr val="accent1"/>
+          </a:fillRef>
+          <a:effectRef idx="2">
+            <a:schemeClr val="accent1"/>
+          </a:effectRef>
+          <a:fontRef idx="minor">
+            <a:schemeClr val="lt1"/>
+          </a:fontRef>
+        </p:style>
+        <p:txBody>
+          <a:bodyPr tIns="140400" rtlCol="0" anchor="t"/>
+          <a:lstStyle/>
+          <a:p>
+            <a:pPr algn="ctr"/>
+            <a:endParaRPr lang="en-US" sz="1600">
+              <a:latin typeface="Open Sans"/>
+              <a:cs typeface="Open Sans"/>
+            </a:endParaRPr>
+          </a:p>
+        </p:txBody>
+      </p:sp>
+      <p:cxnSp>
+        <p:nvCxnSpPr>
+          <p:cNvPr id="6" name="Straight Connector 5"/>
+          <p:cNvCxnSpPr/>
+          <p:nvPr/>
+        </p:nvCxnSpPr>
+        <p:spPr>
+          <a:xfrm>
+            <a:off x="3827648" y="2928672"/>
+            <a:ext cx="4080876" cy="10272"/>
+          </a:xfrm>
+          <a:prstGeom prst="line">
+            <a:avLst/>
+          </a:prstGeom>
+          <a:solidFill>
+            <a:srgbClr val="3F80CD"/>
+          </a:solidFill>
+          <a:ln w="38100" cmpd="sng">
+            <a:solidFill>
+              <a:schemeClr val="tx1">
+                <a:lumMod val="65000"/>
+                <a:lumOff val="35000"/>
+              </a:schemeClr>
+            </a:solidFill>
+            <a:headEnd type="oval" w="lg" len="lg"/>
+            <a:tailEnd type="arrow" w="lg" len="lg"/>
+          </a:ln>
+          <a:effectLst/>
+        </p:spPr>
+        <p:style>
+          <a:lnRef idx="1">
+            <a:schemeClr val="accent1"/>
+          </a:lnRef>
+          <a:fillRef idx="3">
+            <a:schemeClr val="accent1"/>
+          </a:fillRef>
+          <a:effectRef idx="2">
+            <a:schemeClr val="accent1"/>
+          </a:effectRef>
+          <a:fontRef idx="minor">
+            <a:schemeClr val="lt1"/>
+          </a:fontRef>
+        </p:style>
+      </p:cxnSp>
+      <p:cxnSp>
+        <p:nvCxnSpPr>
+          <p:cNvPr id="7" name="Straight Connector 6"/>
+          <p:cNvCxnSpPr>
+            <a:stCxn id="5" idx="2"/>
+          </p:cNvCxnSpPr>
+          <p:nvPr/>
+        </p:nvCxnSpPr>
+        <p:spPr>
+          <a:xfrm>
+            <a:off x="3831167" y="1286933"/>
+            <a:ext cx="0" cy="3996266"/>
+          </a:xfrm>
+          <a:prstGeom prst="line">
+            <a:avLst/>
+          </a:prstGeom>
+          <a:solidFill>
+            <a:srgbClr val="3F80CD"/>
+          </a:solidFill>
+          <a:ln w="28575" cmpd="sng">
+            <a:solidFill>
+              <a:schemeClr val="bg1">
+                <a:lumMod val="75000"/>
+              </a:schemeClr>
+            </a:solidFill>
+            <a:prstDash val="lgDash"/>
+            <a:headEnd type="oval" w="lg" len="lg"/>
+          </a:ln>
+          <a:effectLst/>
+        </p:spPr>
+        <p:style>
+          <a:lnRef idx="1">
+            <a:schemeClr val="accent1"/>
+          </a:lnRef>
+          <a:fillRef idx="3">
+            <a:schemeClr val="accent1"/>
+          </a:fillRef>
+          <a:effectRef idx="2">
+            <a:schemeClr val="accent1"/>
+          </a:effectRef>
+          <a:fontRef idx="minor">
+            <a:schemeClr val="lt1"/>
+          </a:fontRef>
+        </p:style>
+      </p:cxnSp>
+      <p:cxnSp>
+        <p:nvCxnSpPr>
+          <p:cNvPr id="10" name="Straight Connector 9"/>
+          <p:cNvCxnSpPr>
+            <a:stCxn id="4" idx="2"/>
+          </p:cNvCxnSpPr>
+          <p:nvPr/>
+        </p:nvCxnSpPr>
+        <p:spPr>
+          <a:xfrm>
+            <a:off x="7901444" y="1286934"/>
+            <a:ext cx="0" cy="3996266"/>
+          </a:xfrm>
+          <a:prstGeom prst="line">
+            <a:avLst/>
+          </a:prstGeom>
+          <a:solidFill>
+            <a:srgbClr val="3F80CD"/>
+          </a:solidFill>
+          <a:ln w="28575" cmpd="sng">
+            <a:solidFill>
+              <a:schemeClr val="bg1">
+                <a:lumMod val="75000"/>
+              </a:schemeClr>
+            </a:solidFill>
+            <a:prstDash val="lgDash"/>
+            <a:headEnd type="oval" w="lg" len="lg"/>
+          </a:ln>
+          <a:effectLst/>
+        </p:spPr>
+        <p:style>
+          <a:lnRef idx="1">
+            <a:schemeClr val="accent1"/>
+          </a:lnRef>
+          <a:fillRef idx="3">
+            <a:schemeClr val="accent1"/>
+          </a:fillRef>
+          <a:effectRef idx="2">
+            <a:schemeClr val="accent1"/>
+          </a:effectRef>
+          <a:fontRef idx="minor">
+            <a:schemeClr val="lt1"/>
+          </a:fontRef>
+        </p:style>
+      </p:cxnSp>
+      <p:cxnSp>
+        <p:nvCxnSpPr>
+          <p:cNvPr id="16" name="Straight Connector 15"/>
+          <p:cNvCxnSpPr/>
+          <p:nvPr/>
+        </p:nvCxnSpPr>
+        <p:spPr>
+          <a:xfrm flipH="1" flipV="1">
+            <a:off x="3879237" y="4652215"/>
+            <a:ext cx="4029288" cy="5462"/>
+          </a:xfrm>
+          <a:prstGeom prst="line">
+            <a:avLst/>
+          </a:prstGeom>
+          <a:solidFill>
+            <a:srgbClr val="3F80CD"/>
+          </a:solidFill>
+          <a:ln w="38100" cmpd="sng">
+            <a:solidFill>
+              <a:schemeClr val="tx1">
+                <a:lumMod val="65000"/>
+                <a:lumOff val="35000"/>
+              </a:schemeClr>
+            </a:solidFill>
+            <a:headEnd type="oval" w="lg" len="lg"/>
+            <a:tailEnd type="arrow" w="lg" len="lg"/>
+          </a:ln>
+          <a:effectLst/>
+        </p:spPr>
+        <p:style>
+          <a:lnRef idx="1">
+            <a:schemeClr val="accent1"/>
+          </a:lnRef>
+          <a:fillRef idx="3">
+            <a:schemeClr val="accent1"/>
+          </a:fillRef>
+          <a:effectRef idx="2">
+            <a:schemeClr val="accent1"/>
+          </a:effectRef>
+          <a:fontRef idx="minor">
+            <a:schemeClr val="lt1"/>
+          </a:fontRef>
+        </p:style>
+      </p:cxnSp>
+      <p:sp>
+        <p:nvSpPr>
+          <p:cNvPr id="4" name="Rectangle 3"/>
+          <p:cNvSpPr/>
+          <p:nvPr/>
+        </p:nvSpPr>
+        <p:spPr>
+          <a:xfrm>
+            <a:off x="6787317" y="725115"/>
+            <a:ext cx="2228253" cy="561819"/>
+          </a:xfrm>
+          <a:prstGeom prst="rect">
+            <a:avLst/>
+          </a:prstGeom>
+          <a:solidFill>
+            <a:srgbClr val="DD5E17"/>
+          </a:solidFill>
+          <a:ln>
+            <a:noFill/>
+          </a:ln>
+          <a:effectLst/>
+        </p:spPr>
+        <p:style>
+          <a:lnRef idx="1">
+            <a:schemeClr val="accent1"/>
+          </a:lnRef>
+          <a:fillRef idx="3">
+            <a:schemeClr val="accent1"/>
+          </a:fillRef>
+          <a:effectRef idx="2">
+            <a:schemeClr val="accent1"/>
+          </a:effectRef>
+          <a:fontRef idx="minor">
+            <a:schemeClr val="lt1"/>
+          </a:fontRef>
+        </p:style>
+        <p:txBody>
+          <a:bodyPr tIns="140400" rtlCol="0" anchor="t"/>
+          <a:lstStyle/>
+          <a:p>
+            <a:pPr algn="ctr"/>
+            <a:r>
+              <a:rPr lang="en-US" sz="1600">
+                <a:latin typeface="Open Sans"/>
+                <a:cs typeface="Open Sans"/>
+              </a:rPr>
+              <a:t>Service Bridge</a:t>
+            </a:r>
+          </a:p>
+        </p:txBody>
+      </p:sp>
+      <p:sp>
+        <p:nvSpPr>
+          <p:cNvPr id="5" name="Rectangle 4"/>
+          <p:cNvSpPr/>
+          <p:nvPr/>
+        </p:nvSpPr>
+        <p:spPr>
+          <a:xfrm>
+            <a:off x="2681499" y="725115"/>
+            <a:ext cx="2299336" cy="561818"/>
+          </a:xfrm>
+          <a:prstGeom prst="rect">
+            <a:avLst/>
+          </a:prstGeom>
+          <a:solidFill>
+            <a:srgbClr val="3F80CD"/>
+          </a:solidFill>
+          <a:ln>
+            <a:noFill/>
+          </a:ln>
+          <a:effectLst/>
+        </p:spPr>
+        <p:style>
+          <a:lnRef idx="1">
+            <a:schemeClr val="accent1"/>
+          </a:lnRef>
+          <a:fillRef idx="3">
+            <a:schemeClr val="accent1"/>
+          </a:fillRef>
+          <a:effectRef idx="2">
+            <a:schemeClr val="accent1"/>
+          </a:effectRef>
+          <a:fontRef idx="minor">
+            <a:schemeClr val="lt1"/>
+          </a:fontRef>
+        </p:style>
+        <p:txBody>
+          <a:bodyPr tIns="140400" rtlCol="0" anchor="t"/>
+          <a:lstStyle/>
+          <a:p>
+            <a:pPr algn="ctr"/>
+            <a:r>
+              <a:rPr lang="en-US" sz="1600">
+                <a:latin typeface="Open Sans"/>
+                <a:cs typeface="Open Sans"/>
+              </a:rPr>
+              <a:t>RockScript Server</a:t>
+            </a:r>
+          </a:p>
+        </p:txBody>
+      </p:sp>
+      <p:cxnSp>
+        <p:nvCxnSpPr>
+          <p:cNvPr id="25" name="Straight Connector 24"/>
+          <p:cNvCxnSpPr>
+            <a:stCxn id="23" idx="2"/>
+          </p:cNvCxnSpPr>
+          <p:nvPr/>
+        </p:nvCxnSpPr>
+        <p:spPr>
+          <a:xfrm>
+            <a:off x="1285903" y="1286933"/>
+            <a:ext cx="0" cy="3996267"/>
+          </a:xfrm>
+          <a:prstGeom prst="line">
+            <a:avLst/>
+          </a:prstGeom>
+          <a:solidFill>
+            <a:srgbClr val="3F80CD"/>
+          </a:solidFill>
+          <a:ln w="28575" cmpd="sng">
+            <a:solidFill>
+              <a:schemeClr val="bg1">
+                <a:lumMod val="75000"/>
+              </a:schemeClr>
+            </a:solidFill>
+            <a:prstDash val="lgDash"/>
+            <a:headEnd type="oval" w="lg" len="lg"/>
+          </a:ln>
+          <a:effectLst/>
+        </p:spPr>
+        <p:style>
+          <a:lnRef idx="1">
+            <a:schemeClr val="accent1"/>
+          </a:lnRef>
+          <a:fillRef idx="3">
+            <a:schemeClr val="accent1"/>
+          </a:fillRef>
+          <a:effectRef idx="2">
+            <a:schemeClr val="accent1"/>
+          </a:effectRef>
+          <a:fontRef idx="minor">
+            <a:schemeClr val="lt1"/>
+          </a:fontRef>
+        </p:style>
+      </p:cxnSp>
+      <p:sp>
+        <p:nvSpPr>
+          <p:cNvPr id="23" name="Rectangle 22"/>
+          <p:cNvSpPr/>
+          <p:nvPr/>
+        </p:nvSpPr>
+        <p:spPr>
+          <a:xfrm>
+            <a:off x="136235" y="725115"/>
+            <a:ext cx="2299336" cy="561818"/>
+          </a:xfrm>
+          <a:prstGeom prst="rect">
+            <a:avLst/>
+          </a:prstGeom>
+          <a:solidFill>
+            <a:schemeClr val="tx1">
+              <a:lumMod val="65000"/>
+              <a:lumOff val="35000"/>
+            </a:schemeClr>
+          </a:solidFill>
+          <a:ln>
+            <a:noFill/>
+          </a:ln>
+          <a:effectLst/>
+        </p:spPr>
+        <p:style>
+          <a:lnRef idx="1">
+            <a:schemeClr val="accent1"/>
+          </a:lnRef>
+          <a:fillRef idx="3">
+            <a:schemeClr val="accent1"/>
+          </a:fillRef>
+          <a:effectRef idx="2">
+            <a:schemeClr val="accent1"/>
+          </a:effectRef>
+          <a:fontRef idx="minor">
+            <a:schemeClr val="lt1"/>
+          </a:fontRef>
+        </p:style>
+        <p:txBody>
+          <a:bodyPr tIns="140400" rtlCol="0" anchor="t"/>
+          <a:lstStyle/>
+          <a:p>
+            <a:pPr algn="ctr"/>
+            <a:r>
+              <a:rPr lang="en-US" sz="1600">
+                <a:latin typeface="Open Sans"/>
+                <a:cs typeface="Open Sans"/>
+              </a:rPr>
+              <a:t>RockScript API user</a:t>
+            </a:r>
+          </a:p>
+        </p:txBody>
+      </p:sp>
+      <p:cxnSp>
+        <p:nvCxnSpPr>
+          <p:cNvPr id="24" name="Straight Connector 23"/>
+          <p:cNvCxnSpPr/>
+          <p:nvPr/>
+        </p:nvCxnSpPr>
+        <p:spPr>
+          <a:xfrm flipV="1">
+            <a:off x="1285903" y="2175655"/>
+            <a:ext cx="2545264" cy="24625"/>
+          </a:xfrm>
+          <a:prstGeom prst="line">
+            <a:avLst/>
+          </a:prstGeom>
+          <a:solidFill>
+            <a:srgbClr val="3F80CD"/>
+          </a:solidFill>
+          <a:ln w="38100" cmpd="sng">
+            <a:solidFill>
+              <a:schemeClr val="tx1">
+                <a:lumMod val="65000"/>
+                <a:lumOff val="35000"/>
+              </a:schemeClr>
+            </a:solidFill>
+            <a:headEnd type="oval" w="lg" len="lg"/>
+            <a:tailEnd type="arrow" w="lg" len="lg"/>
+          </a:ln>
+          <a:effectLst/>
+        </p:spPr>
+        <p:style>
+          <a:lnRef idx="1">
+            <a:schemeClr val="accent1"/>
+          </a:lnRef>
+          <a:fillRef idx="3">
+            <a:schemeClr val="accent1"/>
+          </a:fillRef>
+          <a:effectRef idx="2">
+            <a:schemeClr val="accent1"/>
+          </a:effectRef>
+          <a:fontRef idx="minor">
+            <a:schemeClr val="lt1"/>
+          </a:fontRef>
+        </p:style>
+      </p:cxnSp>
+      <p:sp>
+        <p:nvSpPr>
+          <p:cNvPr id="30" name="TextBox 29"/>
+          <p:cNvSpPr txBox="1"/>
+          <p:nvPr/>
+        </p:nvSpPr>
+        <p:spPr>
+          <a:xfrm>
+            <a:off x="1344079" y="1652435"/>
+            <a:ext cx="2182983" cy="523220"/>
+          </a:xfrm>
+          <a:prstGeom prst="rect">
+            <a:avLst/>
+          </a:prstGeom>
+          <a:noFill/>
+        </p:spPr>
+        <p:txBody>
+          <a:bodyPr wrap="none" rtlCol="0">
+            <a:spAutoFit/>
+          </a:bodyPr>
+          <a:lstStyle/>
+          <a:p>
+            <a:r>
+              <a:rPr lang="en-US" sz="1400" b="1" spc="-20">
+                <a:latin typeface="Courier New"/>
+                <a:cs typeface="Courier New"/>
+              </a:rPr>
+              <a:t>POST /command</a:t>
+            </a:r>
+          </a:p>
+          <a:p>
+            <a:r>
+              <a:rPr lang="en-US" sz="1400" b="1" spc="-20">
+                <a:latin typeface="Courier New"/>
+                <a:cs typeface="Courier New"/>
+              </a:rPr>
+              <a:t>{startScript:{...}}</a:t>
+            </a:r>
+          </a:p>
+        </p:txBody>
+      </p:sp>
+      <p:sp>
+        <p:nvSpPr>
+          <p:cNvPr id="19" name="TextBox 18"/>
+          <p:cNvSpPr txBox="1"/>
+          <p:nvPr/>
+        </p:nvSpPr>
+        <p:spPr>
+          <a:xfrm>
+            <a:off x="4006981" y="2397906"/>
+            <a:ext cx="3655426" cy="523220"/>
+          </a:xfrm>
+          <a:prstGeom prst="rect">
+            <a:avLst/>
+          </a:prstGeom>
+          <a:noFill/>
+        </p:spPr>
+        <p:txBody>
+          <a:bodyPr wrap="none" rtlCol="0">
+            <a:spAutoFit/>
+          </a:bodyPr>
+          <a:lstStyle/>
+          <a:p>
+            <a:r>
+              <a:rPr lang="en-US" sz="1400" b="1" spc="-20">
+                <a:latin typeface="Courier New"/>
+                <a:cs typeface="Courier New"/>
+              </a:rPr>
+              <a:t>1) POST /import-url/function-name</a:t>
+            </a:r>
+          </a:p>
+          <a:p>
+            <a:r>
+              <a:rPr lang="en-US" sz="1400" b="1" spc="-20">
+                <a:latin typeface="Courier New"/>
+                <a:cs typeface="Courier New"/>
+              </a:rPr>
+              <a:t>   {...service-function-input...}</a:t>
+            </a:r>
+          </a:p>
+        </p:txBody>
+      </p:sp>
+      <p:sp>
+        <p:nvSpPr>
+          <p:cNvPr id="20" name="TextBox 19"/>
+          <p:cNvSpPr txBox="1"/>
+          <p:nvPr/>
+        </p:nvSpPr>
+        <p:spPr>
+          <a:xfrm>
+            <a:off x="4023529" y="2964470"/>
+            <a:ext cx="3760601" cy="307777"/>
+          </a:xfrm>
+          <a:prstGeom prst="rect">
+            <a:avLst/>
+          </a:prstGeom>
+          <a:noFill/>
+        </p:spPr>
+        <p:txBody>
+          <a:bodyPr wrap="none" rtlCol="0">
+            <a:spAutoFit/>
+          </a:bodyPr>
+          <a:lstStyle/>
+          <a:p>
+            <a:r>
+              <a:rPr lang="en-US" sz="1400" b="1" spc="-20">
+                <a:latin typeface="Courier New"/>
+                <a:cs typeface="Courier New"/>
+              </a:rPr>
+              <a:t>   {...service-function-output...}</a:t>
+            </a:r>
+          </a:p>
+        </p:txBody>
+      </p:sp>
+      <p:sp>
+        <p:nvSpPr>
+          <p:cNvPr id="26" name="TextBox 25"/>
+          <p:cNvSpPr txBox="1"/>
+          <p:nvPr/>
+        </p:nvSpPr>
+        <p:spPr>
+          <a:xfrm>
+            <a:off x="4023529" y="4128995"/>
+            <a:ext cx="2498506" cy="523220"/>
+          </a:xfrm>
+          <a:prstGeom prst="rect">
+            <a:avLst/>
+          </a:prstGeom>
+          <a:noFill/>
+        </p:spPr>
+        <p:txBody>
+          <a:bodyPr wrap="none" rtlCol="0">
+            <a:spAutoFit/>
+          </a:bodyPr>
+          <a:lstStyle/>
+          <a:p>
+            <a:r>
+              <a:rPr lang="en-US" sz="1400" b="1" spc="-20">
+                <a:latin typeface="Courier New"/>
+                <a:cs typeface="Courier New"/>
+              </a:rPr>
+              <a:t>2) POST /commands</a:t>
+            </a:r>
+          </a:p>
+          <a:p>
+            <a:r>
+              <a:rPr lang="en-US" sz="1400" b="1" spc="-20">
+                <a:latin typeface="Courier New"/>
+                <a:cs typeface="Courier New"/>
+              </a:rPr>
+              <a:t>   {endFunction:{...}}</a:t>
+            </a:r>
+          </a:p>
+        </p:txBody>
+      </p:sp>
+    </p:spTree>
+    <p:extLst>
+      <p:ext uri="{BB962C8B-B14F-4D97-AF65-F5344CB8AC3E}">
+        <p14:creationId xmlns:p14="http://schemas.microsoft.com/office/powerpoint/2010/main" val="813812541"/>
+      </p:ext>
+    </p:extLst>
+  </p:cSld>
+  <p:clrMapOvr>
+    <a:masterClrMapping/>
+  </p:clrMapOvr>
 </p:sld>
 </file>
 

</xml_diff>

<commit_message>
Refactored job service to event based state transfer
</commit_message>
<xml_diff>
--- a/docs/diagrams.pptx
+++ b/docs/diagrams.pptx
@@ -5,7 +5,7 @@
     <p:sldMasterId id="2147483648" r:id="rId1"/>
   </p:sldMasterIdLst>
   <p:notesMasterIdLst>
-    <p:notesMasterId r:id="rId7"/>
+    <p:notesMasterId r:id="rId8"/>
   </p:notesMasterIdLst>
   <p:sldIdLst>
     <p:sldId id="264" r:id="rId2"/>
@@ -13,6 +13,7 @@
     <p:sldId id="266" r:id="rId4"/>
     <p:sldId id="268" r:id="rId5"/>
     <p:sldId id="269" r:id="rId6"/>
+    <p:sldId id="270" r:id="rId7"/>
   </p:sldIdLst>
   <p:sldSz cx="9144000" cy="6858000" type="screen4x3"/>
   <p:notesSz cx="6858000" cy="9144000"/>
@@ -195,7 +196,7 @@
           </a:lstStyle>
           <a:p>
             <a:fld id="{AB2E4302-E9AB-0549-A672-F7D42312B8D1}" type="datetimeFigureOut">
-              <a:t>06/12/17</a:t>
+              <a:t>14/12/17</a:t>
             </a:fld>
             <a:endParaRPr lang="en-US"/>
           </a:p>
@@ -1137,7 +1138,7 @@
           <a:lstStyle/>
           <a:p>
             <a:fld id="{E69A878D-89FF-BF47-B66F-1617CBC883C6}" type="datetimeFigureOut">
-              <a:t>06/12/17</a:t>
+              <a:t>14/12/17</a:t>
             </a:fld>
             <a:endParaRPr lang="en-US"/>
           </a:p>
@@ -1329,7 +1330,7 @@
           <a:lstStyle/>
           <a:p>
             <a:fld id="{E69A878D-89FF-BF47-B66F-1617CBC883C6}" type="datetimeFigureOut">
-              <a:t>06/12/17</a:t>
+              <a:t>14/12/17</a:t>
             </a:fld>
             <a:endParaRPr lang="en-US"/>
           </a:p>
@@ -1959,7 +1960,7 @@
           <a:lstStyle/>
           <a:p>
             <a:fld id="{E69A878D-89FF-BF47-B66F-1617CBC883C6}" type="datetimeFigureOut">
-              <a:t>06/12/17</a:t>
+              <a:t>14/12/17</a:t>
             </a:fld>
             <a:endParaRPr lang="en-US"/>
           </a:p>
@@ -2392,7 +2393,7 @@
           <a:lstStyle/>
           <a:p>
             <a:fld id="{E69A878D-89FF-BF47-B66F-1617CBC883C6}" type="datetimeFigureOut">
-              <a:t>06/12/17</a:t>
+              <a:t>14/12/17</a:t>
             </a:fld>
             <a:endParaRPr lang="en-US"/>
           </a:p>
@@ -2523,7 +2524,7 @@
           <a:lstStyle/>
           <a:p>
             <a:fld id="{E69A878D-89FF-BF47-B66F-1617CBC883C6}" type="datetimeFigureOut">
-              <a:t>06/12/17</a:t>
+              <a:t>14/12/17</a:t>
             </a:fld>
             <a:endParaRPr lang="en-US"/>
           </a:p>
@@ -2632,7 +2633,7 @@
           <a:lstStyle/>
           <a:p>
             <a:fld id="{E69A878D-89FF-BF47-B66F-1617CBC883C6}" type="datetimeFigureOut">
-              <a:t>06/12/17</a:t>
+              <a:t>14/12/17</a:t>
             </a:fld>
             <a:endParaRPr lang="en-US"/>
           </a:p>
@@ -2921,7 +2922,7 @@
           <a:lstStyle/>
           <a:p>
             <a:fld id="{E69A878D-89FF-BF47-B66F-1617CBC883C6}" type="datetimeFigureOut">
-              <a:t>06/12/17</a:t>
+              <a:t>14/12/17</a:t>
             </a:fld>
             <a:endParaRPr lang="en-US"/>
           </a:p>
@@ -3187,7 +3188,7 @@
           <a:lstStyle/>
           <a:p>
             <a:fld id="{E69A878D-89FF-BF47-B66F-1617CBC883C6}" type="datetimeFigureOut">
-              <a:t>06/12/17</a:t>
+              <a:t>14/12/17</a:t>
             </a:fld>
             <a:endParaRPr lang="en-US"/>
           </a:p>
@@ -9815,6 +9816,422 @@
     <p:extLst>
       <p:ext uri="{BB962C8B-B14F-4D97-AF65-F5344CB8AC3E}">
         <p14:creationId xmlns:p14="http://schemas.microsoft.com/office/powerpoint/2010/main" val="813812541"/>
+      </p:ext>
+    </p:extLst>
+  </p:cSld>
+  <p:clrMapOvr>
+    <a:masterClrMapping/>
+  </p:clrMapOvr>
+</p:sld>
+</file>
+
+<file path=ppt/slides/slide6.xml><?xml version="1.0" encoding="utf-8"?>
+<p:sld xmlns:a="http://schemas.openxmlformats.org/drawingml/2006/main" xmlns:r="http://schemas.openxmlformats.org/officeDocument/2006/relationships" xmlns:p="http://schemas.openxmlformats.org/presentationml/2006/main">
+  <p:cSld>
+    <p:spTree>
+      <p:nvGrpSpPr>
+        <p:cNvPr id="1" name=""/>
+        <p:cNvGrpSpPr/>
+        <p:nvPr/>
+      </p:nvGrpSpPr>
+      <p:grpSpPr>
+        <a:xfrm>
+          <a:off x="0" y="0"/>
+          <a:ext cx="0" cy="0"/>
+          <a:chOff x="0" y="0"/>
+          <a:chExt cx="0" cy="0"/>
+        </a:xfrm>
+      </p:grpSpPr>
+      <p:sp>
+        <p:nvSpPr>
+          <p:cNvPr id="4" name="Rectangle 3"/>
+          <p:cNvSpPr/>
+          <p:nvPr/>
+        </p:nvSpPr>
+        <p:spPr>
+          <a:xfrm>
+            <a:off x="468797" y="1180891"/>
+            <a:ext cx="1411461" cy="4191209"/>
+          </a:xfrm>
+          <a:prstGeom prst="rect">
+            <a:avLst/>
+          </a:prstGeom>
+          <a:solidFill>
+            <a:srgbClr val="3F80CD"/>
+          </a:solidFill>
+          <a:ln>
+            <a:noFill/>
+          </a:ln>
+          <a:effectLst/>
+        </p:spPr>
+        <p:style>
+          <a:lnRef idx="1">
+            <a:schemeClr val="accent1"/>
+          </a:lnRef>
+          <a:fillRef idx="3">
+            <a:schemeClr val="accent1"/>
+          </a:fillRef>
+          <a:effectRef idx="2">
+            <a:schemeClr val="accent1"/>
+          </a:effectRef>
+          <a:fontRef idx="minor">
+            <a:schemeClr val="lt1"/>
+          </a:fontRef>
+        </p:style>
+        <p:txBody>
+          <a:bodyPr tIns="140400" rtlCol="0" anchor="t"/>
+          <a:lstStyle/>
+          <a:p>
+            <a:pPr algn="ctr"/>
+            <a:r>
+              <a:rPr lang="en-US" sz="2400">
+                <a:latin typeface="Open Sans"/>
+                <a:cs typeface="Open Sans"/>
+              </a:rPr>
+              <a:t>Clients</a:t>
+            </a:r>
+          </a:p>
+        </p:txBody>
+      </p:sp>
+      <p:sp>
+        <p:nvSpPr>
+          <p:cNvPr id="5" name="Rectangle 4"/>
+          <p:cNvSpPr/>
+          <p:nvPr/>
+        </p:nvSpPr>
+        <p:spPr>
+          <a:xfrm>
+            <a:off x="2857054" y="1180891"/>
+            <a:ext cx="3581846" cy="4191209"/>
+          </a:xfrm>
+          <a:prstGeom prst="rect">
+            <a:avLst/>
+          </a:prstGeom>
+          <a:solidFill>
+            <a:srgbClr val="3F80CD"/>
+          </a:solidFill>
+          <a:ln>
+            <a:noFill/>
+          </a:ln>
+          <a:effectLst/>
+        </p:spPr>
+        <p:style>
+          <a:lnRef idx="1">
+            <a:schemeClr val="accent1"/>
+          </a:lnRef>
+          <a:fillRef idx="3">
+            <a:schemeClr val="accent1"/>
+          </a:fillRef>
+          <a:effectRef idx="2">
+            <a:schemeClr val="accent1"/>
+          </a:effectRef>
+          <a:fontRef idx="minor">
+            <a:schemeClr val="lt1"/>
+          </a:fontRef>
+        </p:style>
+        <p:txBody>
+          <a:bodyPr tIns="140400" rtlCol="0" anchor="t"/>
+          <a:lstStyle/>
+          <a:p>
+            <a:pPr algn="ctr"/>
+            <a:r>
+              <a:rPr lang="en-US" sz="2400">
+                <a:latin typeface="Open Sans"/>
+                <a:cs typeface="Open Sans"/>
+              </a:rPr>
+              <a:t>Your service</a:t>
+            </a:r>
+          </a:p>
+        </p:txBody>
+      </p:sp>
+      <p:sp>
+        <p:nvSpPr>
+          <p:cNvPr id="6" name="Rectangle 5"/>
+          <p:cNvSpPr/>
+          <p:nvPr/>
+        </p:nvSpPr>
+        <p:spPr>
+          <a:xfrm>
+            <a:off x="7250597" y="1180891"/>
+            <a:ext cx="1411461" cy="4191209"/>
+          </a:xfrm>
+          <a:prstGeom prst="rect">
+            <a:avLst/>
+          </a:prstGeom>
+          <a:solidFill>
+            <a:srgbClr val="3F80CD"/>
+          </a:solidFill>
+          <a:ln>
+            <a:noFill/>
+          </a:ln>
+          <a:effectLst/>
+        </p:spPr>
+        <p:style>
+          <a:lnRef idx="1">
+            <a:schemeClr val="accent1"/>
+          </a:lnRef>
+          <a:fillRef idx="3">
+            <a:schemeClr val="accent1"/>
+          </a:fillRef>
+          <a:effectRef idx="2">
+            <a:schemeClr val="accent1"/>
+          </a:effectRef>
+          <a:fontRef idx="minor">
+            <a:schemeClr val="lt1"/>
+          </a:fontRef>
+        </p:style>
+        <p:txBody>
+          <a:bodyPr tIns="140400" rtlCol="0" anchor="t"/>
+          <a:lstStyle/>
+          <a:p>
+            <a:pPr algn="ctr"/>
+            <a:r>
+              <a:rPr lang="en-US" sz="2400">
+                <a:latin typeface="Open Sans"/>
+                <a:cs typeface="Open Sans"/>
+              </a:rPr>
+              <a:t>Services </a:t>
+            </a:r>
+          </a:p>
+          <a:p>
+            <a:pPr algn="ctr"/>
+            <a:r>
+              <a:rPr lang="en-US" sz="2400">
+                <a:latin typeface="Open Sans"/>
+                <a:cs typeface="Open Sans"/>
+              </a:rPr>
+              <a:t>used</a:t>
+            </a:r>
+            <a:endParaRPr lang="en-US" sz="2400">
+              <a:latin typeface="Open Sans"/>
+              <a:cs typeface="Open Sans"/>
+            </a:endParaRPr>
+          </a:p>
+        </p:txBody>
+      </p:sp>
+      <p:sp>
+        <p:nvSpPr>
+          <p:cNvPr id="9" name="Rectangle 8"/>
+          <p:cNvSpPr/>
+          <p:nvPr/>
+        </p:nvSpPr>
+        <p:spPr>
+          <a:xfrm>
+            <a:off x="2654300" y="2014734"/>
+            <a:ext cx="953158" cy="2908300"/>
+          </a:xfrm>
+          <a:prstGeom prst="rect">
+            <a:avLst/>
+          </a:prstGeom>
+          <a:solidFill>
+            <a:srgbClr val="FFFFFF"/>
+          </a:solidFill>
+          <a:ln>
+            <a:solidFill>
+              <a:schemeClr val="tx1"/>
+            </a:solidFill>
+          </a:ln>
+          <a:effectLst/>
+        </p:spPr>
+        <p:style>
+          <a:lnRef idx="1">
+            <a:schemeClr val="accent1"/>
+          </a:lnRef>
+          <a:fillRef idx="3">
+            <a:schemeClr val="accent1"/>
+          </a:fillRef>
+          <a:effectRef idx="2">
+            <a:schemeClr val="accent1"/>
+          </a:effectRef>
+          <a:fontRef idx="minor">
+            <a:schemeClr val="lt1"/>
+          </a:fontRef>
+        </p:style>
+        <p:txBody>
+          <a:bodyPr tIns="140400" rtlCol="0" anchor="t"/>
+          <a:lstStyle/>
+          <a:p>
+            <a:pPr algn="ctr"/>
+            <a:r>
+              <a:rPr lang="en-US" sz="2400">
+                <a:solidFill>
+                  <a:schemeClr val="tx1"/>
+                </a:solidFill>
+                <a:latin typeface="Open Sans"/>
+                <a:cs typeface="Open Sans"/>
+              </a:rPr>
+              <a:t>API</a:t>
+            </a:r>
+          </a:p>
+        </p:txBody>
+      </p:sp>
+      <p:sp>
+        <p:nvSpPr>
+          <p:cNvPr id="10" name="Rectangle 9"/>
+          <p:cNvSpPr/>
+          <p:nvPr/>
+        </p:nvSpPr>
+        <p:spPr>
+          <a:xfrm>
+            <a:off x="5130800" y="2014734"/>
+            <a:ext cx="1308100" cy="2908300"/>
+          </a:xfrm>
+          <a:prstGeom prst="rect">
+            <a:avLst/>
+          </a:prstGeom>
+          <a:solidFill>
+            <a:srgbClr val="FFFFFF"/>
+          </a:solidFill>
+          <a:ln>
+            <a:solidFill>
+              <a:schemeClr val="tx1"/>
+            </a:solidFill>
+          </a:ln>
+          <a:effectLst/>
+        </p:spPr>
+        <p:style>
+          <a:lnRef idx="1">
+            <a:schemeClr val="accent1"/>
+          </a:lnRef>
+          <a:fillRef idx="3">
+            <a:schemeClr val="accent1"/>
+          </a:fillRef>
+          <a:effectRef idx="2">
+            <a:schemeClr val="accent1"/>
+          </a:effectRef>
+          <a:fontRef idx="minor">
+            <a:schemeClr val="lt1"/>
+          </a:fontRef>
+        </p:style>
+        <p:txBody>
+          <a:bodyPr tIns="140400" rtlCol="0" anchor="t"/>
+          <a:lstStyle/>
+          <a:p>
+            <a:pPr algn="ctr"/>
+            <a:r>
+              <a:rPr lang="en-US" sz="2400">
+                <a:solidFill>
+                  <a:schemeClr val="tx1"/>
+                </a:solidFill>
+                <a:latin typeface="Open Sans"/>
+                <a:cs typeface="Open Sans"/>
+              </a:rPr>
+              <a:t>Rock</a:t>
+            </a:r>
+          </a:p>
+          <a:p>
+            <a:pPr algn="ctr"/>
+            <a:r>
+              <a:rPr lang="en-US" sz="2400">
+                <a:solidFill>
+                  <a:schemeClr val="tx1"/>
+                </a:solidFill>
+                <a:latin typeface="Open Sans"/>
+                <a:cs typeface="Open Sans"/>
+              </a:rPr>
+              <a:t>Scripts</a:t>
+            </a:r>
+          </a:p>
+        </p:txBody>
+      </p:sp>
+      <p:sp>
+        <p:nvSpPr>
+          <p:cNvPr id="7" name="Right Arrow 6"/>
+          <p:cNvSpPr/>
+          <p:nvPr/>
+        </p:nvSpPr>
+        <p:spPr>
+          <a:xfrm>
+            <a:off x="1984117" y="3033516"/>
+            <a:ext cx="807178" cy="587768"/>
+          </a:xfrm>
+          <a:prstGeom prst="rightArrow">
+            <a:avLst/>
+          </a:prstGeom>
+          <a:solidFill>
+            <a:srgbClr val="FFFFFF"/>
+          </a:solidFill>
+          <a:ln>
+            <a:solidFill>
+              <a:schemeClr val="tx1"/>
+            </a:solidFill>
+          </a:ln>
+          <a:effectLst/>
+        </p:spPr>
+        <p:style>
+          <a:lnRef idx="1">
+            <a:schemeClr val="accent1"/>
+          </a:lnRef>
+          <a:fillRef idx="3">
+            <a:schemeClr val="accent1"/>
+          </a:fillRef>
+          <a:effectRef idx="2">
+            <a:schemeClr val="accent1"/>
+          </a:effectRef>
+          <a:fontRef idx="minor">
+            <a:schemeClr val="lt1"/>
+          </a:fontRef>
+        </p:style>
+        <p:txBody>
+          <a:bodyPr rtlCol="0" anchor="ctr"/>
+          <a:lstStyle/>
+          <a:p>
+            <a:pPr algn="ctr"/>
+            <a:endParaRPr lang="en-US"/>
+          </a:p>
+        </p:txBody>
+      </p:sp>
+      <p:sp>
+        <p:nvSpPr>
+          <p:cNvPr id="8" name="Right Arrow 7"/>
+          <p:cNvSpPr/>
+          <p:nvPr/>
+        </p:nvSpPr>
+        <p:spPr>
+          <a:xfrm>
+            <a:off x="6303719" y="3033516"/>
+            <a:ext cx="807178" cy="587768"/>
+          </a:xfrm>
+          <a:prstGeom prst="rightArrow">
+            <a:avLst/>
+          </a:prstGeom>
+          <a:solidFill>
+            <a:srgbClr val="FFFFFF"/>
+          </a:solidFill>
+          <a:ln>
+            <a:solidFill>
+              <a:schemeClr val="tx1"/>
+            </a:solidFill>
+          </a:ln>
+          <a:effectLst/>
+        </p:spPr>
+        <p:style>
+          <a:lnRef idx="1">
+            <a:schemeClr val="accent1"/>
+          </a:lnRef>
+          <a:fillRef idx="3">
+            <a:schemeClr val="accent1"/>
+          </a:fillRef>
+          <a:effectRef idx="2">
+            <a:schemeClr val="accent1"/>
+          </a:effectRef>
+          <a:fontRef idx="minor">
+            <a:schemeClr val="lt1"/>
+          </a:fontRef>
+        </p:style>
+        <p:txBody>
+          <a:bodyPr rtlCol="0" anchor="ctr"/>
+          <a:lstStyle/>
+          <a:p>
+            <a:pPr algn="ctr"/>
+            <a:endParaRPr lang="en-US"/>
+          </a:p>
+        </p:txBody>
+      </p:sp>
+    </p:spTree>
+    <p:extLst>
+      <p:ext uri="{BB962C8B-B14F-4D97-AF65-F5344CB8AC3E}">
+        <p14:creationId xmlns:p14="http://schemas.microsoft.com/office/powerpoint/2010/main" val="325072946"/>
       </p:ext>
     </p:extLst>
   </p:cSld>

</xml_diff>

<commit_message>
Refactored initialization for some reason that I don't remember
</commit_message>
<xml_diff>
--- a/docs/diagrams.pptx
+++ b/docs/diagrams.pptx
@@ -5,7 +5,7 @@
     <p:sldMasterId id="2147483648" r:id="rId1"/>
   </p:sldMasterIdLst>
   <p:notesMasterIdLst>
-    <p:notesMasterId r:id="rId8"/>
+    <p:notesMasterId r:id="rId9"/>
   </p:notesMasterIdLst>
   <p:sldIdLst>
     <p:sldId id="264" r:id="rId2"/>
@@ -14,6 +14,7 @@
     <p:sldId id="268" r:id="rId5"/>
     <p:sldId id="269" r:id="rId6"/>
     <p:sldId id="270" r:id="rId7"/>
+    <p:sldId id="271" r:id="rId8"/>
   </p:sldIdLst>
   <p:sldSz cx="9144000" cy="6858000" type="screen4x3"/>
   <p:notesSz cx="6858000" cy="9144000"/>
@@ -196,7 +197,7 @@
           </a:lstStyle>
           <a:p>
             <a:fld id="{AB2E4302-E9AB-0549-A672-F7D42312B8D1}" type="datetimeFigureOut">
-              <a:t>14/12/17</a:t>
+              <a:t>08/01/18</a:t>
             </a:fld>
             <a:endParaRPr lang="en-US"/>
           </a:p>
@@ -1138,7 +1139,7 @@
           <a:lstStyle/>
           <a:p>
             <a:fld id="{E69A878D-89FF-BF47-B66F-1617CBC883C6}" type="datetimeFigureOut">
-              <a:t>14/12/17</a:t>
+              <a:t>08/01/18</a:t>
             </a:fld>
             <a:endParaRPr lang="en-US"/>
           </a:p>
@@ -1330,7 +1331,7 @@
           <a:lstStyle/>
           <a:p>
             <a:fld id="{E69A878D-89FF-BF47-B66F-1617CBC883C6}" type="datetimeFigureOut">
-              <a:t>14/12/17</a:t>
+              <a:t>08/01/18</a:t>
             </a:fld>
             <a:endParaRPr lang="en-US"/>
           </a:p>
@@ -1960,7 +1961,7 @@
           <a:lstStyle/>
           <a:p>
             <a:fld id="{E69A878D-89FF-BF47-B66F-1617CBC883C6}" type="datetimeFigureOut">
-              <a:t>14/12/17</a:t>
+              <a:t>08/01/18</a:t>
             </a:fld>
             <a:endParaRPr lang="en-US"/>
           </a:p>
@@ -2393,7 +2394,7 @@
           <a:lstStyle/>
           <a:p>
             <a:fld id="{E69A878D-89FF-BF47-B66F-1617CBC883C6}" type="datetimeFigureOut">
-              <a:t>14/12/17</a:t>
+              <a:t>08/01/18</a:t>
             </a:fld>
             <a:endParaRPr lang="en-US"/>
           </a:p>
@@ -2524,7 +2525,7 @@
           <a:lstStyle/>
           <a:p>
             <a:fld id="{E69A878D-89FF-BF47-B66F-1617CBC883C6}" type="datetimeFigureOut">
-              <a:t>14/12/17</a:t>
+              <a:t>08/01/18</a:t>
             </a:fld>
             <a:endParaRPr lang="en-US"/>
           </a:p>
@@ -2633,7 +2634,7 @@
           <a:lstStyle/>
           <a:p>
             <a:fld id="{E69A878D-89FF-BF47-B66F-1617CBC883C6}" type="datetimeFigureOut">
-              <a:t>14/12/17</a:t>
+              <a:t>08/01/18</a:t>
             </a:fld>
             <a:endParaRPr lang="en-US"/>
           </a:p>
@@ -2922,7 +2923,7 @@
           <a:lstStyle/>
           <a:p>
             <a:fld id="{E69A878D-89FF-BF47-B66F-1617CBC883C6}" type="datetimeFigureOut">
-              <a:t>14/12/17</a:t>
+              <a:t>08/01/18</a:t>
             </a:fld>
             <a:endParaRPr lang="en-US"/>
           </a:p>
@@ -3188,7 +3189,7 @@
           <a:lstStyle/>
           <a:p>
             <a:fld id="{E69A878D-89FF-BF47-B66F-1617CBC883C6}" type="datetimeFigureOut">
-              <a:t>14/12/17</a:t>
+              <a:t>08/01/18</a:t>
             </a:fld>
             <a:endParaRPr lang="en-US"/>
           </a:p>
@@ -10002,10 +10003,6 @@
               </a:rPr>
               <a:t>used</a:t>
             </a:r>
-            <a:endParaRPr lang="en-US" sz="2400">
-              <a:latin typeface="Open Sans"/>
-              <a:cs typeface="Open Sans"/>
-            </a:endParaRPr>
           </a:p>
         </p:txBody>
       </p:sp>
@@ -10232,6 +10229,1297 @@
     <p:extLst>
       <p:ext uri="{BB962C8B-B14F-4D97-AF65-F5344CB8AC3E}">
         <p14:creationId xmlns:p14="http://schemas.microsoft.com/office/powerpoint/2010/main" val="325072946"/>
+      </p:ext>
+    </p:extLst>
+  </p:cSld>
+  <p:clrMapOvr>
+    <a:masterClrMapping/>
+  </p:clrMapOvr>
+</p:sld>
+</file>
+
+<file path=ppt/slides/slide7.xml><?xml version="1.0" encoding="utf-8"?>
+<p:sld xmlns:a="http://schemas.openxmlformats.org/drawingml/2006/main" xmlns:r="http://schemas.openxmlformats.org/officeDocument/2006/relationships" xmlns:p="http://schemas.openxmlformats.org/presentationml/2006/main">
+  <p:cSld>
+    <p:spTree>
+      <p:nvGrpSpPr>
+        <p:cNvPr id="1" name=""/>
+        <p:cNvGrpSpPr/>
+        <p:nvPr/>
+      </p:nvGrpSpPr>
+      <p:grpSpPr>
+        <a:xfrm>
+          <a:off x="0" y="0"/>
+          <a:ext cx="0" cy="0"/>
+          <a:chOff x="0" y="0"/>
+          <a:chExt cx="0" cy="0"/>
+        </a:xfrm>
+      </p:grpSpPr>
+      <p:sp>
+        <p:nvSpPr>
+          <p:cNvPr id="44" name="Rectangle 43"/>
+          <p:cNvSpPr/>
+          <p:nvPr/>
+        </p:nvSpPr>
+        <p:spPr>
+          <a:xfrm>
+            <a:off x="1026198" y="1050545"/>
+            <a:ext cx="1242872" cy="3665388"/>
+          </a:xfrm>
+          <a:prstGeom prst="rect">
+            <a:avLst/>
+          </a:prstGeom>
+          <a:solidFill>
+            <a:srgbClr val="3F80CD"/>
+          </a:solidFill>
+          <a:ln>
+            <a:noFill/>
+          </a:ln>
+          <a:effectLst/>
+        </p:spPr>
+        <p:style>
+          <a:lnRef idx="1">
+            <a:schemeClr val="accent1"/>
+          </a:lnRef>
+          <a:fillRef idx="3">
+            <a:schemeClr val="accent1"/>
+          </a:fillRef>
+          <a:effectRef idx="2">
+            <a:schemeClr val="accent1"/>
+          </a:effectRef>
+          <a:fontRef idx="minor">
+            <a:schemeClr val="lt1"/>
+          </a:fontRef>
+        </p:style>
+        <p:txBody>
+          <a:bodyPr tIns="140400" rtlCol="0" anchor="t"/>
+          <a:lstStyle/>
+          <a:p>
+            <a:pPr algn="ctr"/>
+            <a:r>
+              <a:rPr lang="en-US">
+                <a:latin typeface="Open Sans"/>
+                <a:cs typeface="Open Sans"/>
+              </a:rPr>
+              <a:t>Clients</a:t>
+            </a:r>
+          </a:p>
+        </p:txBody>
+      </p:sp>
+      <p:sp>
+        <p:nvSpPr>
+          <p:cNvPr id="4" name="Rectangle 3"/>
+          <p:cNvSpPr/>
+          <p:nvPr/>
+        </p:nvSpPr>
+        <p:spPr>
+          <a:xfrm>
+            <a:off x="3599048" y="1050545"/>
+            <a:ext cx="1509193" cy="3665388"/>
+          </a:xfrm>
+          <a:prstGeom prst="rect">
+            <a:avLst/>
+          </a:prstGeom>
+          <a:solidFill>
+            <a:srgbClr val="DD5E17"/>
+          </a:solidFill>
+          <a:ln>
+            <a:noFill/>
+          </a:ln>
+          <a:effectLst/>
+        </p:spPr>
+        <p:style>
+          <a:lnRef idx="1">
+            <a:schemeClr val="accent1"/>
+          </a:lnRef>
+          <a:fillRef idx="3">
+            <a:schemeClr val="accent1"/>
+          </a:fillRef>
+          <a:effectRef idx="2">
+            <a:schemeClr val="accent1"/>
+          </a:effectRef>
+          <a:fontRef idx="minor">
+            <a:schemeClr val="lt1"/>
+          </a:fontRef>
+        </p:style>
+        <p:txBody>
+          <a:bodyPr tIns="140400" rtlCol="0" anchor="t"/>
+          <a:lstStyle/>
+          <a:p>
+            <a:pPr algn="ctr"/>
+            <a:r>
+              <a:rPr lang="en-US">
+                <a:latin typeface="Open Sans"/>
+                <a:cs typeface="Open Sans"/>
+              </a:rPr>
+              <a:t>Service</a:t>
+            </a:r>
+          </a:p>
+        </p:txBody>
+      </p:sp>
+      <p:sp>
+        <p:nvSpPr>
+          <p:cNvPr id="5" name="Rectangle 4"/>
+          <p:cNvSpPr/>
+          <p:nvPr/>
+        </p:nvSpPr>
+        <p:spPr>
+          <a:xfrm>
+            <a:off x="3380199" y="2386714"/>
+            <a:ext cx="1327268" cy="563769"/>
+          </a:xfrm>
+          <a:prstGeom prst="rect">
+            <a:avLst/>
+          </a:prstGeom>
+          <a:solidFill>
+            <a:srgbClr val="DD5E17"/>
+          </a:solidFill>
+          <a:ln w="28575" cmpd="sng">
+            <a:solidFill>
+              <a:schemeClr val="bg1"/>
+            </a:solidFill>
+          </a:ln>
+          <a:effectLst/>
+        </p:spPr>
+        <p:style>
+          <a:lnRef idx="1">
+            <a:schemeClr val="accent1"/>
+          </a:lnRef>
+          <a:fillRef idx="3">
+            <a:schemeClr val="accent1"/>
+          </a:fillRef>
+          <a:effectRef idx="2">
+            <a:schemeClr val="accent1"/>
+          </a:effectRef>
+          <a:fontRef idx="minor">
+            <a:schemeClr val="lt1"/>
+          </a:fontRef>
+        </p:style>
+        <p:txBody>
+          <a:bodyPr rIns="108000" rtlCol="0" anchor="ctr"/>
+          <a:lstStyle/>
+          <a:p>
+            <a:pPr algn="ctr"/>
+            <a:r>
+              <a:rPr lang="en-US" sz="1400">
+                <a:latin typeface="Open Sans"/>
+                <a:cs typeface="Open Sans"/>
+              </a:rPr>
+              <a:t>Commands</a:t>
+            </a:r>
+            <a:endParaRPr lang="en-US" sz="1400">
+              <a:latin typeface="Open Sans"/>
+              <a:cs typeface="Open Sans"/>
+            </a:endParaRPr>
+          </a:p>
+        </p:txBody>
+      </p:sp>
+      <p:sp>
+        <p:nvSpPr>
+          <p:cNvPr id="6" name="Rectangle 5"/>
+          <p:cNvSpPr/>
+          <p:nvPr/>
+        </p:nvSpPr>
+        <p:spPr>
+          <a:xfrm>
+            <a:off x="3380199" y="1644485"/>
+            <a:ext cx="1327268" cy="563769"/>
+          </a:xfrm>
+          <a:prstGeom prst="rect">
+            <a:avLst/>
+          </a:prstGeom>
+          <a:solidFill>
+            <a:srgbClr val="DD5E17"/>
+          </a:solidFill>
+          <a:ln w="28575" cmpd="sng">
+            <a:solidFill>
+              <a:schemeClr val="bg1"/>
+            </a:solidFill>
+          </a:ln>
+          <a:effectLst/>
+        </p:spPr>
+        <p:style>
+          <a:lnRef idx="1">
+            <a:schemeClr val="accent1"/>
+          </a:lnRef>
+          <a:fillRef idx="3">
+            <a:schemeClr val="accent1"/>
+          </a:fillRef>
+          <a:effectRef idx="2">
+            <a:schemeClr val="accent1"/>
+          </a:effectRef>
+          <a:fontRef idx="minor">
+            <a:schemeClr val="lt1"/>
+          </a:fontRef>
+        </p:style>
+        <p:txBody>
+          <a:bodyPr rIns="108000" rtlCol="0" anchor="ctr"/>
+          <a:lstStyle/>
+          <a:p>
+            <a:pPr algn="ctr"/>
+            <a:r>
+              <a:rPr lang="en-US" sz="1400">
+                <a:latin typeface="Open Sans"/>
+                <a:cs typeface="Open Sans"/>
+              </a:rPr>
+              <a:t>Queries</a:t>
+            </a:r>
+            <a:endParaRPr lang="en-US" sz="1400">
+              <a:latin typeface="Open Sans"/>
+              <a:cs typeface="Open Sans"/>
+            </a:endParaRPr>
+          </a:p>
+        </p:txBody>
+      </p:sp>
+      <p:sp>
+        <p:nvSpPr>
+          <p:cNvPr id="7" name="Rectangle 6"/>
+          <p:cNvSpPr/>
+          <p:nvPr/>
+        </p:nvSpPr>
+        <p:spPr>
+          <a:xfrm>
+            <a:off x="3380199" y="3119000"/>
+            <a:ext cx="1327268" cy="563769"/>
+          </a:xfrm>
+          <a:prstGeom prst="rect">
+            <a:avLst/>
+          </a:prstGeom>
+          <a:solidFill>
+            <a:srgbClr val="DD5E17"/>
+          </a:solidFill>
+          <a:ln w="28575" cmpd="sng">
+            <a:solidFill>
+              <a:schemeClr val="bg1"/>
+            </a:solidFill>
+          </a:ln>
+          <a:effectLst/>
+        </p:spPr>
+        <p:style>
+          <a:lnRef idx="1">
+            <a:schemeClr val="accent1"/>
+          </a:lnRef>
+          <a:fillRef idx="3">
+            <a:schemeClr val="accent1"/>
+          </a:fillRef>
+          <a:effectRef idx="2">
+            <a:schemeClr val="accent1"/>
+          </a:effectRef>
+          <a:fontRef idx="minor">
+            <a:schemeClr val="lt1"/>
+          </a:fontRef>
+        </p:style>
+        <p:txBody>
+          <a:bodyPr rIns="108000" rtlCol="0" anchor="ctr"/>
+          <a:lstStyle/>
+          <a:p>
+            <a:pPr algn="ctr"/>
+            <a:r>
+              <a:rPr lang="en-US" sz="1400">
+                <a:latin typeface="Open Sans"/>
+                <a:cs typeface="Open Sans"/>
+              </a:rPr>
+              <a:t>Events </a:t>
+            </a:r>
+          </a:p>
+        </p:txBody>
+      </p:sp>
+      <p:cxnSp>
+        <p:nvCxnSpPr>
+          <p:cNvPr id="28" name="Straight Arrow Connector 27"/>
+          <p:cNvCxnSpPr/>
+          <p:nvPr/>
+        </p:nvCxnSpPr>
+        <p:spPr>
+          <a:xfrm>
+            <a:off x="2353733" y="1932841"/>
+            <a:ext cx="609602" cy="0"/>
+          </a:xfrm>
+          <a:prstGeom prst="straightConnector1">
+            <a:avLst/>
+          </a:prstGeom>
+          <a:ln w="28575" cmpd="sng">
+            <a:solidFill>
+              <a:srgbClr val="3F80CD"/>
+            </a:solidFill>
+            <a:tailEnd type="arrow" w="lg" len="lg"/>
+          </a:ln>
+          <a:effectLst/>
+        </p:spPr>
+        <p:style>
+          <a:lnRef idx="2">
+            <a:schemeClr val="accent1"/>
+          </a:lnRef>
+          <a:fillRef idx="0">
+            <a:schemeClr val="accent1"/>
+          </a:fillRef>
+          <a:effectRef idx="1">
+            <a:schemeClr val="accent1"/>
+          </a:effectRef>
+          <a:fontRef idx="minor">
+            <a:schemeClr val="tx1"/>
+          </a:fontRef>
+        </p:style>
+      </p:cxnSp>
+      <p:cxnSp>
+        <p:nvCxnSpPr>
+          <p:cNvPr id="30" name="Straight Arrow Connector 29"/>
+          <p:cNvCxnSpPr/>
+          <p:nvPr/>
+        </p:nvCxnSpPr>
+        <p:spPr>
+          <a:xfrm>
+            <a:off x="2353733" y="2558533"/>
+            <a:ext cx="609600" cy="0"/>
+          </a:xfrm>
+          <a:prstGeom prst="straightConnector1">
+            <a:avLst/>
+          </a:prstGeom>
+          <a:ln w="28575" cmpd="sng">
+            <a:solidFill>
+              <a:srgbClr val="3F80CD"/>
+            </a:solidFill>
+            <a:tailEnd type="arrow" w="lg" len="lg"/>
+          </a:ln>
+          <a:effectLst/>
+        </p:spPr>
+        <p:style>
+          <a:lnRef idx="2">
+            <a:schemeClr val="accent1"/>
+          </a:lnRef>
+          <a:fillRef idx="0">
+            <a:schemeClr val="accent1"/>
+          </a:fillRef>
+          <a:effectRef idx="1">
+            <a:schemeClr val="accent1"/>
+          </a:effectRef>
+          <a:fontRef idx="minor">
+            <a:schemeClr val="tx1"/>
+          </a:fontRef>
+        </p:style>
+      </p:cxnSp>
+      <p:cxnSp>
+        <p:nvCxnSpPr>
+          <p:cNvPr id="50" name="Straight Arrow Connector 49"/>
+          <p:cNvCxnSpPr/>
+          <p:nvPr/>
+        </p:nvCxnSpPr>
+        <p:spPr>
+          <a:xfrm>
+            <a:off x="2353733" y="2813372"/>
+            <a:ext cx="609600" cy="0"/>
+          </a:xfrm>
+          <a:prstGeom prst="straightConnector1">
+            <a:avLst/>
+          </a:prstGeom>
+          <a:ln w="28575" cmpd="sng">
+            <a:solidFill>
+              <a:srgbClr val="3F80CD"/>
+            </a:solidFill>
+            <a:tailEnd type="arrow" w="lg" len="lg"/>
+          </a:ln>
+          <a:effectLst/>
+        </p:spPr>
+        <p:style>
+          <a:lnRef idx="2">
+            <a:schemeClr val="accent1"/>
+          </a:lnRef>
+          <a:fillRef idx="0">
+            <a:schemeClr val="accent1"/>
+          </a:fillRef>
+          <a:effectRef idx="1">
+            <a:schemeClr val="accent1"/>
+          </a:effectRef>
+          <a:fontRef idx="minor">
+            <a:schemeClr val="tx1"/>
+          </a:fontRef>
+        </p:style>
+      </p:cxnSp>
+      <p:sp>
+        <p:nvSpPr>
+          <p:cNvPr id="51" name="Rectangle 50"/>
+          <p:cNvSpPr/>
+          <p:nvPr/>
+        </p:nvSpPr>
+        <p:spPr>
+          <a:xfrm>
+            <a:off x="6282267" y="1050545"/>
+            <a:ext cx="1811871" cy="3665388"/>
+          </a:xfrm>
+          <a:prstGeom prst="rect">
+            <a:avLst/>
+          </a:prstGeom>
+          <a:solidFill>
+            <a:schemeClr val="tx1">
+              <a:lumMod val="65000"/>
+              <a:lumOff val="35000"/>
+            </a:schemeClr>
+          </a:solidFill>
+          <a:ln>
+            <a:noFill/>
+          </a:ln>
+          <a:effectLst/>
+        </p:spPr>
+        <p:style>
+          <a:lnRef idx="1">
+            <a:schemeClr val="accent1"/>
+          </a:lnRef>
+          <a:fillRef idx="3">
+            <a:schemeClr val="accent1"/>
+          </a:fillRef>
+          <a:effectRef idx="2">
+            <a:schemeClr val="accent1"/>
+          </a:effectRef>
+          <a:fontRef idx="minor">
+            <a:schemeClr val="lt1"/>
+          </a:fontRef>
+        </p:style>
+        <p:txBody>
+          <a:bodyPr tIns="140400" rtlCol="0" anchor="t"/>
+          <a:lstStyle/>
+          <a:p>
+            <a:pPr algn="ctr"/>
+            <a:r>
+              <a:rPr lang="en-US">
+                <a:latin typeface="Open Sans"/>
+                <a:cs typeface="Open Sans"/>
+              </a:rPr>
+              <a:t>Dependencies</a:t>
+            </a:r>
+          </a:p>
+        </p:txBody>
+      </p:sp>
+      <p:cxnSp>
+        <p:nvCxnSpPr>
+          <p:cNvPr id="84" name="Straight Arrow Connector 83"/>
+          <p:cNvCxnSpPr/>
+          <p:nvPr/>
+        </p:nvCxnSpPr>
+        <p:spPr>
+          <a:xfrm>
+            <a:off x="5201508" y="3033196"/>
+            <a:ext cx="725159" cy="0"/>
+          </a:xfrm>
+          <a:prstGeom prst="straightConnector1">
+            <a:avLst/>
+          </a:prstGeom>
+          <a:ln w="28575" cmpd="sng">
+            <a:solidFill>
+              <a:srgbClr val="DD5E17"/>
+            </a:solidFill>
+            <a:tailEnd type="arrow" w="lg" len="lg"/>
+          </a:ln>
+          <a:effectLst/>
+        </p:spPr>
+        <p:style>
+          <a:lnRef idx="2">
+            <a:schemeClr val="accent1"/>
+          </a:lnRef>
+          <a:fillRef idx="0">
+            <a:schemeClr val="accent1"/>
+          </a:fillRef>
+          <a:effectRef idx="1">
+            <a:schemeClr val="accent1"/>
+          </a:effectRef>
+          <a:fontRef idx="minor">
+            <a:schemeClr val="tx1"/>
+          </a:fontRef>
+        </p:style>
+      </p:cxnSp>
+      <p:cxnSp>
+        <p:nvCxnSpPr>
+          <p:cNvPr id="91" name="Straight Arrow Connector 90"/>
+          <p:cNvCxnSpPr/>
+          <p:nvPr/>
+        </p:nvCxnSpPr>
+        <p:spPr>
+          <a:xfrm flipH="1">
+            <a:off x="2353733" y="3425419"/>
+            <a:ext cx="609601" cy="0"/>
+          </a:xfrm>
+          <a:prstGeom prst="straightConnector1">
+            <a:avLst/>
+          </a:prstGeom>
+          <a:ln w="28575" cmpd="sng">
+            <a:solidFill>
+              <a:srgbClr val="3F80CD"/>
+            </a:solidFill>
+            <a:tailEnd type="arrow" w="lg" len="lg"/>
+          </a:ln>
+          <a:effectLst/>
+        </p:spPr>
+        <p:style>
+          <a:lnRef idx="2">
+            <a:schemeClr val="accent1"/>
+          </a:lnRef>
+          <a:fillRef idx="0">
+            <a:schemeClr val="accent1"/>
+          </a:fillRef>
+          <a:effectRef idx="1">
+            <a:schemeClr val="accent1"/>
+          </a:effectRef>
+          <a:fontRef idx="minor">
+            <a:schemeClr val="tx1"/>
+          </a:fontRef>
+        </p:style>
+      </p:cxnSp>
+      <p:cxnSp>
+        <p:nvCxnSpPr>
+          <p:cNvPr id="98" name="Straight Arrow Connector 97"/>
+          <p:cNvCxnSpPr/>
+          <p:nvPr/>
+        </p:nvCxnSpPr>
+        <p:spPr>
+          <a:xfrm>
+            <a:off x="5201508" y="2304190"/>
+            <a:ext cx="725159" cy="0"/>
+          </a:xfrm>
+          <a:prstGeom prst="straightConnector1">
+            <a:avLst/>
+          </a:prstGeom>
+          <a:ln w="28575" cmpd="sng">
+            <a:solidFill>
+              <a:srgbClr val="DD5E17"/>
+            </a:solidFill>
+            <a:tailEnd type="arrow" w="lg" len="lg"/>
+          </a:ln>
+          <a:effectLst/>
+        </p:spPr>
+        <p:style>
+          <a:lnRef idx="2">
+            <a:schemeClr val="accent1"/>
+          </a:lnRef>
+          <a:fillRef idx="0">
+            <a:schemeClr val="accent1"/>
+          </a:fillRef>
+          <a:effectRef idx="1">
+            <a:schemeClr val="accent1"/>
+          </a:effectRef>
+          <a:fontRef idx="minor">
+            <a:schemeClr val="tx1"/>
+          </a:fontRef>
+        </p:style>
+      </p:cxnSp>
+      <p:sp>
+        <p:nvSpPr>
+          <p:cNvPr id="99" name="Rectangle 98"/>
+          <p:cNvSpPr/>
+          <p:nvPr/>
+        </p:nvSpPr>
+        <p:spPr>
+          <a:xfrm>
+            <a:off x="3857128" y="3933117"/>
+            <a:ext cx="1555750" cy="559403"/>
+          </a:xfrm>
+          <a:prstGeom prst="rect">
+            <a:avLst/>
+          </a:prstGeom>
+          <a:solidFill>
+            <a:schemeClr val="tx1">
+              <a:lumMod val="65000"/>
+              <a:lumOff val="35000"/>
+            </a:schemeClr>
+          </a:solidFill>
+          <a:ln w="28575" cmpd="sng">
+            <a:solidFill>
+              <a:schemeClr val="bg1"/>
+            </a:solidFill>
+          </a:ln>
+          <a:effectLst/>
+        </p:spPr>
+        <p:style>
+          <a:lnRef idx="1">
+            <a:schemeClr val="accent1"/>
+          </a:lnRef>
+          <a:fillRef idx="3">
+            <a:schemeClr val="accent1"/>
+          </a:fillRef>
+          <a:effectRef idx="2">
+            <a:schemeClr val="accent1"/>
+          </a:effectRef>
+          <a:fontRef idx="minor">
+            <a:schemeClr val="lt1"/>
+          </a:fontRef>
+        </p:style>
+        <p:txBody>
+          <a:bodyPr rIns="108000" rtlCol="0" anchor="ctr"/>
+          <a:lstStyle/>
+          <a:p>
+            <a:pPr algn="ctr"/>
+            <a:r>
+              <a:rPr lang="en-US" sz="1400">
+                <a:latin typeface="Open Sans"/>
+                <a:cs typeface="Open Sans"/>
+              </a:rPr>
+              <a:t>Events from dependencies</a:t>
+            </a:r>
+            <a:endParaRPr lang="en-US" sz="1400">
+              <a:latin typeface="Open Sans"/>
+              <a:cs typeface="Open Sans"/>
+            </a:endParaRPr>
+          </a:p>
+        </p:txBody>
+      </p:sp>
+      <p:sp>
+        <p:nvSpPr>
+          <p:cNvPr id="111" name="TextBox 110"/>
+          <p:cNvSpPr txBox="1"/>
+          <p:nvPr/>
+        </p:nvSpPr>
+        <p:spPr>
+          <a:xfrm>
+            <a:off x="3021197" y="1838078"/>
+            <a:ext cx="470441" cy="189525"/>
+          </a:xfrm>
+          <a:prstGeom prst="rect">
+            <a:avLst/>
+          </a:prstGeom>
+          <a:solidFill>
+            <a:schemeClr val="bg1"/>
+          </a:solidFill>
+          <a:ln>
+            <a:solidFill>
+              <a:srgbClr val="DD5E17"/>
+            </a:solidFill>
+          </a:ln>
+          <a:effectLst/>
+        </p:spPr>
+        <p:style>
+          <a:lnRef idx="1">
+            <a:schemeClr val="accent1"/>
+          </a:lnRef>
+          <a:fillRef idx="3">
+            <a:schemeClr val="accent1"/>
+          </a:fillRef>
+          <a:effectRef idx="2">
+            <a:schemeClr val="accent1"/>
+          </a:effectRef>
+          <a:fontRef idx="minor">
+            <a:schemeClr val="lt1"/>
+          </a:fontRef>
+        </p:style>
+        <p:txBody>
+          <a:bodyPr lIns="0" tIns="0" rIns="0" bIns="0" rtlCol="0" anchor="ctr"/>
+          <a:lstStyle>
+            <a:defPPr>
+              <a:defRPr lang="en-US"/>
+            </a:defPPr>
+            <a:lvl1pPr algn="ctr">
+              <a:defRPr>
+                <a:solidFill>
+                  <a:schemeClr val="lt1"/>
+                </a:solidFill>
+                <a:latin typeface="Open Sans"/>
+                <a:cs typeface="Open Sans"/>
+              </a:defRPr>
+            </a:lvl1pPr>
+            <a:lvl2pPr>
+              <a:defRPr>
+                <a:solidFill>
+                  <a:schemeClr val="lt1"/>
+                </a:solidFill>
+              </a:defRPr>
+            </a:lvl2pPr>
+            <a:lvl3pPr>
+              <a:defRPr>
+                <a:solidFill>
+                  <a:schemeClr val="lt1"/>
+                </a:solidFill>
+              </a:defRPr>
+            </a:lvl3pPr>
+            <a:lvl4pPr>
+              <a:defRPr>
+                <a:solidFill>
+                  <a:schemeClr val="lt1"/>
+                </a:solidFill>
+              </a:defRPr>
+            </a:lvl4pPr>
+            <a:lvl5pPr>
+              <a:defRPr>
+                <a:solidFill>
+                  <a:schemeClr val="lt1"/>
+                </a:solidFill>
+              </a:defRPr>
+            </a:lvl5pPr>
+            <a:lvl6pPr>
+              <a:defRPr>
+                <a:solidFill>
+                  <a:schemeClr val="lt1"/>
+                </a:solidFill>
+              </a:defRPr>
+            </a:lvl6pPr>
+            <a:lvl7pPr>
+              <a:defRPr>
+                <a:solidFill>
+                  <a:schemeClr val="lt1"/>
+                </a:solidFill>
+              </a:defRPr>
+            </a:lvl7pPr>
+            <a:lvl8pPr>
+              <a:defRPr>
+                <a:solidFill>
+                  <a:schemeClr val="lt1"/>
+                </a:solidFill>
+              </a:defRPr>
+            </a:lvl8pPr>
+            <a:lvl9pPr>
+              <a:defRPr>
+                <a:solidFill>
+                  <a:schemeClr val="lt1"/>
+                </a:solidFill>
+              </a:defRPr>
+            </a:lvl9pPr>
+          </a:lstStyle>
+          <a:p>
+            <a:r>
+              <a:rPr lang="en-US" sz="1100" b="1">
+                <a:solidFill>
+                  <a:srgbClr val="DD5E17"/>
+                </a:solidFill>
+              </a:rPr>
+              <a:t>HTTP</a:t>
+            </a:r>
+          </a:p>
+        </p:txBody>
+      </p:sp>
+      <p:sp>
+        <p:nvSpPr>
+          <p:cNvPr id="113" name="TextBox 112"/>
+          <p:cNvSpPr txBox="1"/>
+          <p:nvPr/>
+        </p:nvSpPr>
+        <p:spPr>
+          <a:xfrm>
+            <a:off x="3021197" y="2469274"/>
+            <a:ext cx="470441" cy="189525"/>
+          </a:xfrm>
+          <a:prstGeom prst="rect">
+            <a:avLst/>
+          </a:prstGeom>
+          <a:solidFill>
+            <a:schemeClr val="bg1"/>
+          </a:solidFill>
+          <a:ln>
+            <a:solidFill>
+              <a:srgbClr val="DD5E17"/>
+            </a:solidFill>
+          </a:ln>
+          <a:effectLst/>
+        </p:spPr>
+        <p:style>
+          <a:lnRef idx="1">
+            <a:schemeClr val="accent1"/>
+          </a:lnRef>
+          <a:fillRef idx="3">
+            <a:schemeClr val="accent1"/>
+          </a:fillRef>
+          <a:effectRef idx="2">
+            <a:schemeClr val="accent1"/>
+          </a:effectRef>
+          <a:fontRef idx="minor">
+            <a:schemeClr val="lt1"/>
+          </a:fontRef>
+        </p:style>
+        <p:txBody>
+          <a:bodyPr lIns="0" tIns="0" rIns="0" bIns="0" rtlCol="0" anchor="ctr"/>
+          <a:lstStyle>
+            <a:defPPr>
+              <a:defRPr lang="en-US"/>
+            </a:defPPr>
+            <a:lvl1pPr algn="ctr">
+              <a:defRPr>
+                <a:solidFill>
+                  <a:schemeClr val="lt1"/>
+                </a:solidFill>
+                <a:latin typeface="Open Sans"/>
+                <a:cs typeface="Open Sans"/>
+              </a:defRPr>
+            </a:lvl1pPr>
+            <a:lvl2pPr>
+              <a:defRPr>
+                <a:solidFill>
+                  <a:schemeClr val="lt1"/>
+                </a:solidFill>
+              </a:defRPr>
+            </a:lvl2pPr>
+            <a:lvl3pPr>
+              <a:defRPr>
+                <a:solidFill>
+                  <a:schemeClr val="lt1"/>
+                </a:solidFill>
+              </a:defRPr>
+            </a:lvl3pPr>
+            <a:lvl4pPr>
+              <a:defRPr>
+                <a:solidFill>
+                  <a:schemeClr val="lt1"/>
+                </a:solidFill>
+              </a:defRPr>
+            </a:lvl4pPr>
+            <a:lvl5pPr>
+              <a:defRPr>
+                <a:solidFill>
+                  <a:schemeClr val="lt1"/>
+                </a:solidFill>
+              </a:defRPr>
+            </a:lvl5pPr>
+            <a:lvl6pPr>
+              <a:defRPr>
+                <a:solidFill>
+                  <a:schemeClr val="lt1"/>
+                </a:solidFill>
+              </a:defRPr>
+            </a:lvl6pPr>
+            <a:lvl7pPr>
+              <a:defRPr>
+                <a:solidFill>
+                  <a:schemeClr val="lt1"/>
+                </a:solidFill>
+              </a:defRPr>
+            </a:lvl7pPr>
+            <a:lvl8pPr>
+              <a:defRPr>
+                <a:solidFill>
+                  <a:schemeClr val="lt1"/>
+                </a:solidFill>
+              </a:defRPr>
+            </a:lvl8pPr>
+            <a:lvl9pPr>
+              <a:defRPr>
+                <a:solidFill>
+                  <a:schemeClr val="lt1"/>
+                </a:solidFill>
+              </a:defRPr>
+            </a:lvl9pPr>
+          </a:lstStyle>
+          <a:p>
+            <a:r>
+              <a:rPr lang="en-US" sz="1100" b="1">
+                <a:solidFill>
+                  <a:srgbClr val="DD5E17"/>
+                </a:solidFill>
+              </a:rPr>
+              <a:t>HTTP</a:t>
+            </a:r>
+          </a:p>
+        </p:txBody>
+      </p:sp>
+      <p:sp>
+        <p:nvSpPr>
+          <p:cNvPr id="115" name="Can 114"/>
+          <p:cNvSpPr/>
+          <p:nvPr/>
+        </p:nvSpPr>
+        <p:spPr>
+          <a:xfrm rot="16200000">
+            <a:off x="3147725" y="3206570"/>
+            <a:ext cx="189525" cy="442578"/>
+          </a:xfrm>
+          <a:prstGeom prst="can">
+            <a:avLst>
+              <a:gd name="adj" fmla="val 36168"/>
+            </a:avLst>
+          </a:prstGeom>
+          <a:solidFill>
+            <a:schemeClr val="bg1"/>
+          </a:solidFill>
+          <a:ln>
+            <a:solidFill>
+              <a:srgbClr val="DD5E17"/>
+            </a:solidFill>
+          </a:ln>
+          <a:effectLst/>
+        </p:spPr>
+        <p:style>
+          <a:lnRef idx="1">
+            <a:schemeClr val="accent1"/>
+          </a:lnRef>
+          <a:fillRef idx="3">
+            <a:schemeClr val="accent1"/>
+          </a:fillRef>
+          <a:effectRef idx="2">
+            <a:schemeClr val="accent1"/>
+          </a:effectRef>
+          <a:fontRef idx="minor">
+            <a:schemeClr val="lt1"/>
+          </a:fontRef>
+        </p:style>
+        <p:txBody>
+          <a:bodyPr vert="vert" lIns="36000" tIns="0" rIns="0" bIns="0" rtlCol="0" anchor="ctr"/>
+          <a:lstStyle/>
+          <a:p>
+            <a:pPr algn="ctr"/>
+            <a:r>
+              <a:rPr lang="en-US" sz="1100" b="1">
+                <a:solidFill>
+                  <a:srgbClr val="DD5E17"/>
+                </a:solidFill>
+                <a:latin typeface="Open Sans"/>
+                <a:cs typeface="Open Sans"/>
+              </a:rPr>
+              <a:t>Q</a:t>
+            </a:r>
+          </a:p>
+        </p:txBody>
+      </p:sp>
+      <p:cxnSp>
+        <p:nvCxnSpPr>
+          <p:cNvPr id="124" name="Straight Arrow Connector 123"/>
+          <p:cNvCxnSpPr/>
+          <p:nvPr/>
+        </p:nvCxnSpPr>
+        <p:spPr>
+          <a:xfrm flipH="1">
+            <a:off x="5785317" y="4212819"/>
+            <a:ext cx="419079" cy="0"/>
+          </a:xfrm>
+          <a:prstGeom prst="straightConnector1">
+            <a:avLst/>
+          </a:prstGeom>
+          <a:ln w="28575" cmpd="sng">
+            <a:solidFill>
+              <a:schemeClr val="tx1">
+                <a:lumMod val="65000"/>
+                <a:lumOff val="35000"/>
+              </a:schemeClr>
+            </a:solidFill>
+            <a:tailEnd type="arrow" w="lg" len="lg"/>
+          </a:ln>
+          <a:effectLst/>
+        </p:spPr>
+        <p:style>
+          <a:lnRef idx="2">
+            <a:schemeClr val="accent1"/>
+          </a:lnRef>
+          <a:fillRef idx="0">
+            <a:schemeClr val="accent1"/>
+          </a:fillRef>
+          <a:effectRef idx="1">
+            <a:schemeClr val="accent1"/>
+          </a:effectRef>
+          <a:fontRef idx="minor">
+            <a:schemeClr val="tx1"/>
+          </a:fontRef>
+        </p:style>
+      </p:cxnSp>
+      <p:sp>
+        <p:nvSpPr>
+          <p:cNvPr id="125" name="TextBox 124"/>
+          <p:cNvSpPr txBox="1"/>
+          <p:nvPr/>
+        </p:nvSpPr>
+        <p:spPr>
+          <a:xfrm>
+            <a:off x="6001067" y="2198506"/>
+            <a:ext cx="470441" cy="189525"/>
+          </a:xfrm>
+          <a:prstGeom prst="rect">
+            <a:avLst/>
+          </a:prstGeom>
+          <a:solidFill>
+            <a:schemeClr val="bg1"/>
+          </a:solidFill>
+          <a:ln>
+            <a:solidFill>
+              <a:schemeClr val="tx1">
+                <a:lumMod val="65000"/>
+                <a:lumOff val="35000"/>
+              </a:schemeClr>
+            </a:solidFill>
+          </a:ln>
+          <a:effectLst/>
+        </p:spPr>
+        <p:style>
+          <a:lnRef idx="1">
+            <a:schemeClr val="accent1"/>
+          </a:lnRef>
+          <a:fillRef idx="3">
+            <a:schemeClr val="accent1"/>
+          </a:fillRef>
+          <a:effectRef idx="2">
+            <a:schemeClr val="accent1"/>
+          </a:effectRef>
+          <a:fontRef idx="minor">
+            <a:schemeClr val="lt1"/>
+          </a:fontRef>
+        </p:style>
+        <p:txBody>
+          <a:bodyPr lIns="0" tIns="0" rIns="0" bIns="0" rtlCol="0" anchor="ctr"/>
+          <a:lstStyle>
+            <a:defPPr>
+              <a:defRPr lang="en-US"/>
+            </a:defPPr>
+            <a:lvl1pPr algn="ctr">
+              <a:defRPr>
+                <a:solidFill>
+                  <a:schemeClr val="lt1"/>
+                </a:solidFill>
+                <a:latin typeface="Open Sans"/>
+                <a:cs typeface="Open Sans"/>
+              </a:defRPr>
+            </a:lvl1pPr>
+            <a:lvl2pPr>
+              <a:defRPr>
+                <a:solidFill>
+                  <a:schemeClr val="lt1"/>
+                </a:solidFill>
+              </a:defRPr>
+            </a:lvl2pPr>
+            <a:lvl3pPr>
+              <a:defRPr>
+                <a:solidFill>
+                  <a:schemeClr val="lt1"/>
+                </a:solidFill>
+              </a:defRPr>
+            </a:lvl3pPr>
+            <a:lvl4pPr>
+              <a:defRPr>
+                <a:solidFill>
+                  <a:schemeClr val="lt1"/>
+                </a:solidFill>
+              </a:defRPr>
+            </a:lvl4pPr>
+            <a:lvl5pPr>
+              <a:defRPr>
+                <a:solidFill>
+                  <a:schemeClr val="lt1"/>
+                </a:solidFill>
+              </a:defRPr>
+            </a:lvl5pPr>
+            <a:lvl6pPr>
+              <a:defRPr>
+                <a:solidFill>
+                  <a:schemeClr val="lt1"/>
+                </a:solidFill>
+              </a:defRPr>
+            </a:lvl6pPr>
+            <a:lvl7pPr>
+              <a:defRPr>
+                <a:solidFill>
+                  <a:schemeClr val="lt1"/>
+                </a:solidFill>
+              </a:defRPr>
+            </a:lvl7pPr>
+            <a:lvl8pPr>
+              <a:defRPr>
+                <a:solidFill>
+                  <a:schemeClr val="lt1"/>
+                </a:solidFill>
+              </a:defRPr>
+            </a:lvl8pPr>
+            <a:lvl9pPr>
+              <a:defRPr>
+                <a:solidFill>
+                  <a:schemeClr val="lt1"/>
+                </a:solidFill>
+              </a:defRPr>
+            </a:lvl9pPr>
+          </a:lstStyle>
+          <a:p>
+            <a:r>
+              <a:rPr lang="en-US" sz="1100" b="1">
+                <a:solidFill>
+                  <a:schemeClr val="tx1">
+                    <a:lumMod val="65000"/>
+                    <a:lumOff val="35000"/>
+                  </a:schemeClr>
+                </a:solidFill>
+              </a:rPr>
+              <a:t>HTTP</a:t>
+            </a:r>
+          </a:p>
+        </p:txBody>
+      </p:sp>
+      <p:sp>
+        <p:nvSpPr>
+          <p:cNvPr id="130" name="Can 129"/>
+          <p:cNvSpPr/>
+          <p:nvPr/>
+        </p:nvSpPr>
+        <p:spPr>
+          <a:xfrm rot="16200000">
+            <a:off x="3147726" y="2592082"/>
+            <a:ext cx="189525" cy="442578"/>
+          </a:xfrm>
+          <a:prstGeom prst="can">
+            <a:avLst>
+              <a:gd name="adj" fmla="val 36168"/>
+            </a:avLst>
+          </a:prstGeom>
+          <a:solidFill>
+            <a:schemeClr val="bg1"/>
+          </a:solidFill>
+          <a:ln>
+            <a:solidFill>
+              <a:srgbClr val="DD5E17"/>
+            </a:solidFill>
+          </a:ln>
+          <a:effectLst/>
+        </p:spPr>
+        <p:style>
+          <a:lnRef idx="1">
+            <a:schemeClr val="accent1"/>
+          </a:lnRef>
+          <a:fillRef idx="3">
+            <a:schemeClr val="accent1"/>
+          </a:fillRef>
+          <a:effectRef idx="2">
+            <a:schemeClr val="accent1"/>
+          </a:effectRef>
+          <a:fontRef idx="minor">
+            <a:schemeClr val="lt1"/>
+          </a:fontRef>
+        </p:style>
+        <p:txBody>
+          <a:bodyPr vert="vert" lIns="36000" tIns="0" rIns="0" bIns="0" rtlCol="0" anchor="ctr"/>
+          <a:lstStyle/>
+          <a:p>
+            <a:pPr algn="ctr"/>
+            <a:r>
+              <a:rPr lang="en-US" sz="1100" b="1">
+                <a:solidFill>
+                  <a:srgbClr val="DD5E17"/>
+                </a:solidFill>
+                <a:latin typeface="Open Sans"/>
+                <a:cs typeface="Open Sans"/>
+              </a:rPr>
+              <a:t>Q</a:t>
+            </a:r>
+          </a:p>
+        </p:txBody>
+      </p:sp>
+      <p:sp>
+        <p:nvSpPr>
+          <p:cNvPr id="131" name="Can 130"/>
+          <p:cNvSpPr/>
+          <p:nvPr/>
+        </p:nvSpPr>
+        <p:spPr>
+          <a:xfrm rot="16200000">
+            <a:off x="5403744" y="3991529"/>
+            <a:ext cx="189525" cy="442578"/>
+          </a:xfrm>
+          <a:prstGeom prst="can">
+            <a:avLst>
+              <a:gd name="adj" fmla="val 36168"/>
+            </a:avLst>
+          </a:prstGeom>
+          <a:solidFill>
+            <a:schemeClr val="bg1"/>
+          </a:solidFill>
+          <a:ln>
+            <a:solidFill>
+              <a:schemeClr val="tx1">
+                <a:lumMod val="65000"/>
+                <a:lumOff val="35000"/>
+              </a:schemeClr>
+            </a:solidFill>
+          </a:ln>
+          <a:effectLst/>
+        </p:spPr>
+        <p:style>
+          <a:lnRef idx="1">
+            <a:schemeClr val="accent1"/>
+          </a:lnRef>
+          <a:fillRef idx="3">
+            <a:schemeClr val="accent1"/>
+          </a:fillRef>
+          <a:effectRef idx="2">
+            <a:schemeClr val="accent1"/>
+          </a:effectRef>
+          <a:fontRef idx="minor">
+            <a:schemeClr val="lt1"/>
+          </a:fontRef>
+        </p:style>
+        <p:txBody>
+          <a:bodyPr vert="vert" lIns="36000" tIns="0" rIns="0" bIns="0" rtlCol="0" anchor="ctr"/>
+          <a:lstStyle/>
+          <a:p>
+            <a:pPr algn="ctr"/>
+            <a:r>
+              <a:rPr lang="en-US" sz="1100" b="1">
+                <a:solidFill>
+                  <a:schemeClr val="tx1">
+                    <a:lumMod val="65000"/>
+                    <a:lumOff val="35000"/>
+                  </a:schemeClr>
+                </a:solidFill>
+                <a:latin typeface="Open Sans"/>
+                <a:cs typeface="Open Sans"/>
+              </a:rPr>
+              <a:t>Q</a:t>
+            </a:r>
+          </a:p>
+        </p:txBody>
+      </p:sp>
+      <p:sp>
+        <p:nvSpPr>
+          <p:cNvPr id="133" name="Can 132"/>
+          <p:cNvSpPr/>
+          <p:nvPr/>
+        </p:nvSpPr>
+        <p:spPr>
+          <a:xfrm rot="5400000" flipH="1">
+            <a:off x="6127593" y="2802948"/>
+            <a:ext cx="189525" cy="442578"/>
+          </a:xfrm>
+          <a:prstGeom prst="can">
+            <a:avLst>
+              <a:gd name="adj" fmla="val 36168"/>
+            </a:avLst>
+          </a:prstGeom>
+          <a:solidFill>
+            <a:schemeClr val="bg1"/>
+          </a:solidFill>
+          <a:ln>
+            <a:solidFill>
+              <a:schemeClr val="tx1">
+                <a:lumMod val="65000"/>
+                <a:lumOff val="35000"/>
+              </a:schemeClr>
+            </a:solidFill>
+          </a:ln>
+          <a:effectLst/>
+        </p:spPr>
+        <p:style>
+          <a:lnRef idx="1">
+            <a:schemeClr val="accent1"/>
+          </a:lnRef>
+          <a:fillRef idx="3">
+            <a:schemeClr val="accent1"/>
+          </a:fillRef>
+          <a:effectRef idx="2">
+            <a:schemeClr val="accent1"/>
+          </a:effectRef>
+          <a:fontRef idx="minor">
+            <a:schemeClr val="lt1"/>
+          </a:fontRef>
+        </p:style>
+        <p:txBody>
+          <a:bodyPr vert="vert270" lIns="0" tIns="0" rIns="36000" bIns="0" rtlCol="0" anchor="ctr"/>
+          <a:lstStyle/>
+          <a:p>
+            <a:pPr algn="ctr"/>
+            <a:r>
+              <a:rPr lang="en-US" sz="1100" b="1">
+                <a:solidFill>
+                  <a:schemeClr val="tx1">
+                    <a:lumMod val="65000"/>
+                    <a:lumOff val="35000"/>
+                  </a:schemeClr>
+                </a:solidFill>
+                <a:latin typeface="Open Sans"/>
+                <a:cs typeface="Open Sans"/>
+              </a:rPr>
+              <a:t>Q</a:t>
+            </a:r>
+          </a:p>
+        </p:txBody>
+      </p:sp>
+    </p:spTree>
+    <p:extLst>
+      <p:ext uri="{BB962C8B-B14F-4D97-AF65-F5344CB8AC3E}">
+        <p14:creationId xmlns:p14="http://schemas.microsoft.com/office/powerpoint/2010/main" val="2245077295"/>
       </p:ext>
     </p:extLst>
   </p:cSld>

</xml_diff>

<commit_message>
Added if-then-else and assignment
</commit_message>
<xml_diff>
--- a/docs/diagrams.pptx
+++ b/docs/diagrams.pptx
@@ -197,7 +197,7 @@
           </a:lstStyle>
           <a:p>
             <a:fld id="{AB2E4302-E9AB-0549-A672-F7D42312B8D1}" type="datetimeFigureOut">
-              <a:t>08/01/18</a:t>
+              <a:t>13/01/18</a:t>
             </a:fld>
             <a:endParaRPr lang="en-US"/>
           </a:p>
@@ -1139,7 +1139,7 @@
           <a:lstStyle/>
           <a:p>
             <a:fld id="{E69A878D-89FF-BF47-B66F-1617CBC883C6}" type="datetimeFigureOut">
-              <a:t>08/01/18</a:t>
+              <a:t>13/01/18</a:t>
             </a:fld>
             <a:endParaRPr lang="en-US"/>
           </a:p>
@@ -1331,7 +1331,7 @@
           <a:lstStyle/>
           <a:p>
             <a:fld id="{E69A878D-89FF-BF47-B66F-1617CBC883C6}" type="datetimeFigureOut">
-              <a:t>08/01/18</a:t>
+              <a:t>13/01/18</a:t>
             </a:fld>
             <a:endParaRPr lang="en-US"/>
           </a:p>
@@ -1961,7 +1961,7 @@
           <a:lstStyle/>
           <a:p>
             <a:fld id="{E69A878D-89FF-BF47-B66F-1617CBC883C6}" type="datetimeFigureOut">
-              <a:t>08/01/18</a:t>
+              <a:t>13/01/18</a:t>
             </a:fld>
             <a:endParaRPr lang="en-US"/>
           </a:p>
@@ -2394,7 +2394,7 @@
           <a:lstStyle/>
           <a:p>
             <a:fld id="{E69A878D-89FF-BF47-B66F-1617CBC883C6}" type="datetimeFigureOut">
-              <a:t>08/01/18</a:t>
+              <a:t>13/01/18</a:t>
             </a:fld>
             <a:endParaRPr lang="en-US"/>
           </a:p>
@@ -2525,7 +2525,7 @@
           <a:lstStyle/>
           <a:p>
             <a:fld id="{E69A878D-89FF-BF47-B66F-1617CBC883C6}" type="datetimeFigureOut">
-              <a:t>08/01/18</a:t>
+              <a:t>13/01/18</a:t>
             </a:fld>
             <a:endParaRPr lang="en-US"/>
           </a:p>
@@ -2634,7 +2634,7 @@
           <a:lstStyle/>
           <a:p>
             <a:fld id="{E69A878D-89FF-BF47-B66F-1617CBC883C6}" type="datetimeFigureOut">
-              <a:t>08/01/18</a:t>
+              <a:t>13/01/18</a:t>
             </a:fld>
             <a:endParaRPr lang="en-US"/>
           </a:p>
@@ -2923,7 +2923,7 @@
           <a:lstStyle/>
           <a:p>
             <a:fld id="{E69A878D-89FF-BF47-B66F-1617CBC883C6}" type="datetimeFigureOut">
-              <a:t>08/01/18</a:t>
+              <a:t>13/01/18</a:t>
             </a:fld>
             <a:endParaRPr lang="en-US"/>
           </a:p>
@@ -3189,7 +3189,7 @@
           <a:lstStyle/>
           <a:p>
             <a:fld id="{E69A878D-89FF-BF47-B66F-1617CBC883C6}" type="datetimeFigureOut">
-              <a:t>08/01/18</a:t>
+              <a:t>13/01/18</a:t>
             </a:fld>
             <a:endParaRPr lang="en-US"/>
           </a:p>
@@ -10407,10 +10407,6 @@
               </a:rPr>
               <a:t>Commands</a:t>
             </a:r>
-            <a:endParaRPr lang="en-US" sz="1400">
-              <a:latin typeface="Open Sans"/>
-              <a:cs typeface="Open Sans"/>
-            </a:endParaRPr>
           </a:p>
         </p:txBody>
       </p:sp>
@@ -10464,10 +10460,6 @@
               </a:rPr>
               <a:t>Queries</a:t>
             </a:r>
-            <a:endParaRPr lang="en-US" sz="1400">
-              <a:latin typeface="Open Sans"/>
-              <a:cs typeface="Open Sans"/>
-            </a:endParaRPr>
           </a:p>
         </p:txBody>
       </p:sp>
@@ -10853,10 +10845,6 @@
               </a:rPr>
               <a:t>Events from dependencies</a:t>
             </a:r>
-            <a:endParaRPr lang="en-US" sz="1400">
-              <a:latin typeface="Open Sans"/>
-              <a:cs typeface="Open Sans"/>
-            </a:endParaRPr>
           </a:p>
         </p:txBody>
       </p:sp>

</xml_diff>